<commit_message>
Réalisation de la présentation du projet
</commit_message>
<xml_diff>
--- a/presentation_bibliogest_francis_normand.pptx
+++ b/presentation_bibliogest_francis_normand.pptx
@@ -5,7 +5,7 @@
     <p:sldMasterId id="2147483648" r:id="rId1"/>
   </p:sldMasterIdLst>
   <p:notesMasterIdLst>
-    <p:notesMasterId r:id="rId9"/>
+    <p:notesMasterId r:id="rId11"/>
   </p:notesMasterIdLst>
   <p:sldIdLst>
     <p:sldId id="256" r:id="rId2"/>
@@ -15,6 +15,8 @@
     <p:sldId id="260" r:id="rId6"/>
     <p:sldId id="261" r:id="rId7"/>
     <p:sldId id="262" r:id="rId8"/>
+    <p:sldId id="263" r:id="rId9"/>
+    <p:sldId id="264" r:id="rId10"/>
   </p:sldIdLst>
   <p:sldSz cx="9144000" cy="6858000" type="screen4x3"/>
   <p:notesSz cx="6858000" cy="9144000"/>
@@ -218,7 +220,7 @@
             <a:fld id="{15721FE5-6845-46AD-96E9-F55ECB995014}" type="datetimeFigureOut">
               <a:rPr lang="fr-CH" smtClean="0"/>
               <a:pPr/>
-              <a:t>05.06.2018</a:t>
+              <a:t>06.06.2018</a:t>
             </a:fld>
             <a:endParaRPr lang="fr-CH"/>
           </a:p>
@@ -1990,13 +1992,8 @@
             </a:fld>
             <a:r>
               <a:rPr lang="fr-CH" sz="1600" dirty="0"/>
-              <a:t> sur </a:t>
-            </a:r>
-            <a:fld id="{F6C38908-BF14-42A1-B6B2-9CCB7CE44A0A}" type="slidenum">
-              <a:rPr lang="fr-CH" sz="1600" smtClean="0"/>
-              <a:pPr/>
-              <a:t>‹N°›</a:t>
-            </a:fld>
+              <a:t> sur 9</a:t>
+            </a:r>
             <a:r>
               <a:rPr lang="fr-CH" dirty="0"/>
               <a:t> </a:t>
@@ -2555,6 +2552,9 @@
   <p:clrMapOvr>
     <a:masterClrMapping/>
   </p:clrMapOvr>
+  <p:transition spd="slow">
+    <p:push dir="u"/>
+  </p:transition>
 </p:sld>
 </file>
 
@@ -2626,13 +2626,31 @@
           <a:p>
             <a:r>
               <a:rPr lang="fr-CH" dirty="0"/>
-              <a:t>Gestion des livres possédés</a:t>
+              <a:t>Pouvoir gérer :</a:t>
             </a:r>
           </a:p>
           <a:p>
             <a:r>
               <a:rPr lang="fr-CH" dirty="0"/>
-              <a:t>Gestion des livres souhaités</a:t>
+              <a:t>Les livres possédés</a:t>
+            </a:r>
+          </a:p>
+          <a:p>
+            <a:r>
+              <a:rPr lang="fr-CH" dirty="0"/>
+              <a:t> - avec description</a:t>
+            </a:r>
+          </a:p>
+          <a:p>
+            <a:r>
+              <a:rPr lang="fr-CH" dirty="0"/>
+              <a:t> - avec avis et note</a:t>
+            </a:r>
+          </a:p>
+          <a:p>
+            <a:r>
+              <a:rPr lang="fr-CH" dirty="0"/>
+              <a:t>Les livres désirés</a:t>
             </a:r>
           </a:p>
           <a:p>
@@ -2683,6 +2701,9 @@
   <p:clrMapOvr>
     <a:masterClrMapping/>
   </p:clrMapOvr>
+  <p:transition spd="slow">
+    <p:push dir="u"/>
+  </p:transition>
   <p:timing>
     <p:tnLst>
       <p:par>
@@ -2704,20 +2725,318 @@
                             </p:stCondLst>
                             <p:childTnLst>
                               <p:par>
-                                <p:cTn id="5" presetID="6" presetClass="emph" presetSubtype="0" fill="hold" nodeType="clickEffect">
+                                <p:cTn id="5" presetID="42" presetClass="path" presetSubtype="0" accel="50000" decel="50000" fill="hold" nodeType="clickEffect">
+                                  <p:stCondLst>
+                                    <p:cond delay="0"/>
+                                  </p:stCondLst>
+                                  <p:childTnLst>
+                                    <p:animMotion origin="layout" path="M -1.94444E-6 4.44444E-6 L 0.27465 -0.03635 " pathEditMode="relative" rAng="0" ptsTypes="AA">
+                                      <p:cBhvr>
+                                        <p:cTn id="6" dur="2000" fill="hold"/>
+                                        <p:tgtEl>
+                                          <p:spTgt spid="4"/>
+                                        </p:tgtEl>
+                                        <p:attrNameLst>
+                                          <p:attrName>ppt_x</p:attrName>
+                                          <p:attrName>ppt_y</p:attrName>
+                                        </p:attrNameLst>
+                                      </p:cBhvr>
+                                      <p:rCtr x="13733" y="-1829"/>
+                                    </p:animMotion>
+                                  </p:childTnLst>
+                                </p:cTn>
+                              </p:par>
+                              <p:par>
+                                <p:cTn id="7" presetID="6" presetClass="emph" presetSubtype="0" fill="hold" nodeType="withEffect">
                                   <p:stCondLst>
                                     <p:cond delay="0"/>
                                   </p:stCondLst>
                                   <p:childTnLst>
                                     <p:animScale>
                                       <p:cBhvr>
-                                        <p:cTn id="6" dur="2000" fill="hold"/>
+                                        <p:cTn id="8" dur="1000" fill="hold"/>
                                         <p:tgtEl>
                                           <p:spTgt spid="4"/>
                                         </p:tgtEl>
                                       </p:cBhvr>
-                                      <p:by x="150000" y="150000"/>
+                                      <p:by x="50000" y="50000"/>
                                     </p:animScale>
+                                  </p:childTnLst>
+                                </p:cTn>
+                              </p:par>
+                              <p:par>
+                                <p:cTn id="9" presetID="1" presetClass="entr" presetSubtype="0" fill="hold" grpId="0" nodeType="withEffect">
+                                  <p:stCondLst>
+                                    <p:cond delay="0"/>
+                                  </p:stCondLst>
+                                  <p:childTnLst>
+                                    <p:set>
+                                      <p:cBhvr>
+                                        <p:cTn id="10" dur="1" fill="hold">
+                                          <p:stCondLst>
+                                            <p:cond delay="0"/>
+                                          </p:stCondLst>
+                                        </p:cTn>
+                                        <p:tgtEl>
+                                          <p:spTgt spid="3">
+                                            <p:txEl>
+                                              <p:pRg st="0" end="0"/>
+                                            </p:txEl>
+                                          </p:spTgt>
+                                        </p:tgtEl>
+                                        <p:attrNameLst>
+                                          <p:attrName>style.visibility</p:attrName>
+                                        </p:attrNameLst>
+                                      </p:cBhvr>
+                                      <p:to>
+                                        <p:strVal val="visible"/>
+                                      </p:to>
+                                    </p:set>
+                                  </p:childTnLst>
+                                </p:cTn>
+                              </p:par>
+                            </p:childTnLst>
+                          </p:cTn>
+                        </p:par>
+                      </p:childTnLst>
+                    </p:cTn>
+                  </p:par>
+                  <p:par>
+                    <p:cTn id="11" fill="hold">
+                      <p:stCondLst>
+                        <p:cond delay="indefinite"/>
+                      </p:stCondLst>
+                      <p:childTnLst>
+                        <p:par>
+                          <p:cTn id="12" fill="hold">
+                            <p:stCondLst>
+                              <p:cond delay="0"/>
+                            </p:stCondLst>
+                            <p:childTnLst>
+                              <p:par>
+                                <p:cTn id="13" presetID="1" presetClass="entr" presetSubtype="0" fill="hold" grpId="0" nodeType="clickEffect">
+                                  <p:stCondLst>
+                                    <p:cond delay="0"/>
+                                  </p:stCondLst>
+                                  <p:childTnLst>
+                                    <p:set>
+                                      <p:cBhvr>
+                                        <p:cTn id="14" dur="1" fill="hold">
+                                          <p:stCondLst>
+                                            <p:cond delay="0"/>
+                                          </p:stCondLst>
+                                        </p:cTn>
+                                        <p:tgtEl>
+                                          <p:spTgt spid="3">
+                                            <p:txEl>
+                                              <p:pRg st="1" end="1"/>
+                                            </p:txEl>
+                                          </p:spTgt>
+                                        </p:tgtEl>
+                                        <p:attrNameLst>
+                                          <p:attrName>style.visibility</p:attrName>
+                                        </p:attrNameLst>
+                                      </p:cBhvr>
+                                      <p:to>
+                                        <p:strVal val="visible"/>
+                                      </p:to>
+                                    </p:set>
+                                  </p:childTnLst>
+                                </p:cTn>
+                              </p:par>
+                            </p:childTnLst>
+                          </p:cTn>
+                        </p:par>
+                      </p:childTnLst>
+                    </p:cTn>
+                  </p:par>
+                  <p:par>
+                    <p:cTn id="15" fill="hold">
+                      <p:stCondLst>
+                        <p:cond delay="indefinite"/>
+                      </p:stCondLst>
+                      <p:childTnLst>
+                        <p:par>
+                          <p:cTn id="16" fill="hold">
+                            <p:stCondLst>
+                              <p:cond delay="0"/>
+                            </p:stCondLst>
+                            <p:childTnLst>
+                              <p:par>
+                                <p:cTn id="17" presetID="1" presetClass="entr" presetSubtype="0" fill="hold" grpId="0" nodeType="clickEffect">
+                                  <p:stCondLst>
+                                    <p:cond delay="0"/>
+                                  </p:stCondLst>
+                                  <p:childTnLst>
+                                    <p:set>
+                                      <p:cBhvr>
+                                        <p:cTn id="18" dur="1" fill="hold">
+                                          <p:stCondLst>
+                                            <p:cond delay="0"/>
+                                          </p:stCondLst>
+                                        </p:cTn>
+                                        <p:tgtEl>
+                                          <p:spTgt spid="3">
+                                            <p:txEl>
+                                              <p:pRg st="2" end="2"/>
+                                            </p:txEl>
+                                          </p:spTgt>
+                                        </p:tgtEl>
+                                        <p:attrNameLst>
+                                          <p:attrName>style.visibility</p:attrName>
+                                        </p:attrNameLst>
+                                      </p:cBhvr>
+                                      <p:to>
+                                        <p:strVal val="visible"/>
+                                      </p:to>
+                                    </p:set>
+                                  </p:childTnLst>
+                                </p:cTn>
+                              </p:par>
+                            </p:childTnLst>
+                          </p:cTn>
+                        </p:par>
+                      </p:childTnLst>
+                    </p:cTn>
+                  </p:par>
+                  <p:par>
+                    <p:cTn id="19" fill="hold">
+                      <p:stCondLst>
+                        <p:cond delay="indefinite"/>
+                      </p:stCondLst>
+                      <p:childTnLst>
+                        <p:par>
+                          <p:cTn id="20" fill="hold">
+                            <p:stCondLst>
+                              <p:cond delay="0"/>
+                            </p:stCondLst>
+                            <p:childTnLst>
+                              <p:par>
+                                <p:cTn id="21" presetID="1" presetClass="entr" presetSubtype="0" fill="hold" grpId="0" nodeType="clickEffect">
+                                  <p:stCondLst>
+                                    <p:cond delay="0"/>
+                                  </p:stCondLst>
+                                  <p:childTnLst>
+                                    <p:set>
+                                      <p:cBhvr>
+                                        <p:cTn id="22" dur="1" fill="hold">
+                                          <p:stCondLst>
+                                            <p:cond delay="0"/>
+                                          </p:stCondLst>
+                                        </p:cTn>
+                                        <p:tgtEl>
+                                          <p:spTgt spid="3">
+                                            <p:txEl>
+                                              <p:pRg st="3" end="3"/>
+                                            </p:txEl>
+                                          </p:spTgt>
+                                        </p:tgtEl>
+                                        <p:attrNameLst>
+                                          <p:attrName>style.visibility</p:attrName>
+                                        </p:attrNameLst>
+                                      </p:cBhvr>
+                                      <p:to>
+                                        <p:strVal val="visible"/>
+                                      </p:to>
+                                    </p:set>
+                                  </p:childTnLst>
+                                </p:cTn>
+                              </p:par>
+                            </p:childTnLst>
+                          </p:cTn>
+                        </p:par>
+                      </p:childTnLst>
+                    </p:cTn>
+                  </p:par>
+                  <p:par>
+                    <p:cTn id="23" fill="hold">
+                      <p:stCondLst>
+                        <p:cond delay="indefinite"/>
+                      </p:stCondLst>
+                      <p:childTnLst>
+                        <p:par>
+                          <p:cTn id="24" fill="hold">
+                            <p:stCondLst>
+                              <p:cond delay="0"/>
+                            </p:stCondLst>
+                            <p:childTnLst>
+                              <p:par>
+                                <p:cTn id="25" presetID="1" presetClass="entr" presetSubtype="0" fill="hold" grpId="0" nodeType="clickEffect">
+                                  <p:stCondLst>
+                                    <p:cond delay="0"/>
+                                  </p:stCondLst>
+                                  <p:childTnLst>
+                                    <p:set>
+                                      <p:cBhvr>
+                                        <p:cTn id="26" dur="1" fill="hold">
+                                          <p:stCondLst>
+                                            <p:cond delay="0"/>
+                                          </p:stCondLst>
+                                        </p:cTn>
+                                        <p:tgtEl>
+                                          <p:spTgt spid="3">
+                                            <p:txEl>
+                                              <p:pRg st="4" end="4"/>
+                                            </p:txEl>
+                                          </p:spTgt>
+                                        </p:tgtEl>
+                                        <p:attrNameLst>
+                                          <p:attrName>style.visibility</p:attrName>
+                                        </p:attrNameLst>
+                                      </p:cBhvr>
+                                      <p:to>
+                                        <p:strVal val="visible"/>
+                                      </p:to>
+                                    </p:set>
+                                  </p:childTnLst>
+                                </p:cTn>
+                              </p:par>
+                            </p:childTnLst>
+                          </p:cTn>
+                        </p:par>
+                      </p:childTnLst>
+                    </p:cTn>
+                  </p:par>
+                  <p:par>
+                    <p:cTn id="27" fill="hold">
+                      <p:stCondLst>
+                        <p:cond delay="indefinite"/>
+                      </p:stCondLst>
+                      <p:childTnLst>
+                        <p:par>
+                          <p:cTn id="28" fill="hold">
+                            <p:stCondLst>
+                              <p:cond delay="0"/>
+                            </p:stCondLst>
+                            <p:childTnLst>
+                              <p:par>
+                                <p:cTn id="29" presetID="1" presetClass="entr" presetSubtype="0" fill="hold" grpId="0" nodeType="clickEffect">
+                                  <p:stCondLst>
+                                    <p:cond delay="0"/>
+                                  </p:stCondLst>
+                                  <p:childTnLst>
+                                    <p:set>
+                                      <p:cBhvr>
+                                        <p:cTn id="30" dur="1" fill="hold">
+                                          <p:stCondLst>
+                                            <p:cond delay="0"/>
+                                          </p:stCondLst>
+                                        </p:cTn>
+                                        <p:tgtEl>
+                                          <p:spTgt spid="3">
+                                            <p:txEl>
+                                              <p:pRg st="5" end="5"/>
+                                            </p:txEl>
+                                          </p:spTgt>
+                                        </p:tgtEl>
+                                        <p:attrNameLst>
+                                          <p:attrName>style.visibility</p:attrName>
+                                        </p:attrNameLst>
+                                      </p:cBhvr>
+                                      <p:to>
+                                        <p:strVal val="visible"/>
+                                      </p:to>
+                                    </p:set>
                                   </p:childTnLst>
                                 </p:cTn>
                               </p:par>
@@ -2748,6 +3067,9 @@
         </p:cTn>
       </p:par>
     </p:tnLst>
+    <p:bldLst>
+      <p:bldP spid="3" grpId="0" uiExpand="1" build="p"/>
+    </p:bldLst>
   </p:timing>
 </p:sld>
 </file>
@@ -2818,10 +3140,74 @@
           <a:bodyPr/>
           <a:lstStyle/>
           <a:p>
-            <a:endParaRPr lang="fr-CH"/>
+            <a:r>
+              <a:rPr lang="fr-CH" dirty="0"/>
+              <a:t>Application développée en JAVA EE</a:t>
+            </a:r>
+          </a:p>
+          <a:p>
+            <a:r>
+              <a:rPr lang="fr-CH" dirty="0"/>
+              <a:t>Application WEB</a:t>
+            </a:r>
+          </a:p>
+          <a:p>
+            <a:r>
+              <a:rPr lang="fr-CH" dirty="0"/>
+              <a:t>Framework CSS : Bootstrap</a:t>
+            </a:r>
+          </a:p>
+          <a:p>
+            <a:endParaRPr lang="fr-CH" dirty="0"/>
           </a:p>
         </p:txBody>
       </p:sp>
+      <p:pic>
+        <p:nvPicPr>
+          <p:cNvPr id="5" name="Image 4">
+            <a:extLst>
+              <a:ext uri="{FF2B5EF4-FFF2-40B4-BE49-F238E27FC236}">
+                <a16:creationId xmlns:a16="http://schemas.microsoft.com/office/drawing/2014/main" id="{E6FF13EE-D70D-49FF-8642-8CBB71A5A6FF}"/>
+              </a:ext>
+            </a:extLst>
+          </p:cNvPr>
+          <p:cNvPicPr>
+            <a:picLocks noChangeAspect="1"/>
+          </p:cNvPicPr>
+          <p:nvPr/>
+        </p:nvPicPr>
+        <p:blipFill>
+          <a:blip r:embed="rId2" cstate="print">
+            <a:clrChange>
+              <a:clrFrom>
+                <a:srgbClr val="FFFFFF"/>
+              </a:clrFrom>
+              <a:clrTo>
+                <a:srgbClr val="FFFFFF">
+                  <a:alpha val="0"/>
+                </a:srgbClr>
+              </a:clrTo>
+            </a:clrChange>
+            <a:extLst>
+              <a:ext uri="{28A0092B-C50C-407E-A947-70E740481C1C}">
+                <a14:useLocalDpi xmlns:a14="http://schemas.microsoft.com/office/drawing/2010/main" val="0"/>
+              </a:ext>
+            </a:extLst>
+          </a:blip>
+          <a:stretch>
+            <a:fillRect/>
+          </a:stretch>
+        </p:blipFill>
+        <p:spPr>
+          <a:xfrm>
+            <a:off x="2699792" y="3614302"/>
+            <a:ext cx="2875680" cy="2548898"/>
+          </a:xfrm>
+          <a:prstGeom prst="rect">
+            <a:avLst/>
+          </a:prstGeom>
+        </p:spPr>
+      </p:pic>
     </p:spTree>
     <p:extLst>
       <p:ext uri="{BB962C8B-B14F-4D97-AF65-F5344CB8AC3E}">
@@ -2832,6 +3218,213 @@
   <p:clrMapOvr>
     <a:masterClrMapping/>
   </p:clrMapOvr>
+  <p:transition spd="slow">
+    <p:push dir="u"/>
+  </p:transition>
+  <p:timing>
+    <p:tnLst>
+      <p:par>
+        <p:cTn id="1" dur="indefinite" restart="never" nodeType="tmRoot">
+          <p:childTnLst>
+            <p:seq concurrent="1" nextAc="seek">
+              <p:cTn id="2" dur="indefinite" nodeType="mainSeq">
+                <p:childTnLst>
+                  <p:par>
+                    <p:cTn id="3" fill="hold">
+                      <p:stCondLst>
+                        <p:cond delay="indefinite"/>
+                      </p:stCondLst>
+                      <p:childTnLst>
+                        <p:par>
+                          <p:cTn id="4" fill="hold">
+                            <p:stCondLst>
+                              <p:cond delay="0"/>
+                            </p:stCondLst>
+                            <p:childTnLst>
+                              <p:par>
+                                <p:cTn id="5" presetID="1" presetClass="entr" presetSubtype="0" fill="hold" nodeType="clickEffect">
+                                  <p:stCondLst>
+                                    <p:cond delay="0"/>
+                                  </p:stCondLst>
+                                  <p:childTnLst>
+                                    <p:set>
+                                      <p:cBhvr>
+                                        <p:cTn id="6" dur="1" fill="hold">
+                                          <p:stCondLst>
+                                            <p:cond delay="0"/>
+                                          </p:stCondLst>
+                                        </p:cTn>
+                                        <p:tgtEl>
+                                          <p:spTgt spid="3">
+                                            <p:txEl>
+                                              <p:pRg st="0" end="0"/>
+                                            </p:txEl>
+                                          </p:spTgt>
+                                        </p:tgtEl>
+                                        <p:attrNameLst>
+                                          <p:attrName>style.visibility</p:attrName>
+                                        </p:attrNameLst>
+                                      </p:cBhvr>
+                                      <p:to>
+                                        <p:strVal val="visible"/>
+                                      </p:to>
+                                    </p:set>
+                                  </p:childTnLst>
+                                </p:cTn>
+                              </p:par>
+                              <p:par>
+                                <p:cTn id="7" presetID="1" presetClass="entr" presetSubtype="0" fill="hold" nodeType="withEffect">
+                                  <p:stCondLst>
+                                    <p:cond delay="0"/>
+                                  </p:stCondLst>
+                                  <p:childTnLst>
+                                    <p:set>
+                                      <p:cBhvr>
+                                        <p:cTn id="8" dur="1" fill="hold">
+                                          <p:stCondLst>
+                                            <p:cond delay="0"/>
+                                          </p:stCondLst>
+                                        </p:cTn>
+                                        <p:tgtEl>
+                                          <p:spTgt spid="5"/>
+                                        </p:tgtEl>
+                                        <p:attrNameLst>
+                                          <p:attrName>style.visibility</p:attrName>
+                                        </p:attrNameLst>
+                                      </p:cBhvr>
+                                      <p:to>
+                                        <p:strVal val="visible"/>
+                                      </p:to>
+                                    </p:set>
+                                  </p:childTnLst>
+                                </p:cTn>
+                              </p:par>
+                            </p:childTnLst>
+                          </p:cTn>
+                        </p:par>
+                      </p:childTnLst>
+                    </p:cTn>
+                  </p:par>
+                  <p:par>
+                    <p:cTn id="9" fill="hold">
+                      <p:stCondLst>
+                        <p:cond delay="indefinite"/>
+                      </p:stCondLst>
+                      <p:childTnLst>
+                        <p:par>
+                          <p:cTn id="10" fill="hold">
+                            <p:stCondLst>
+                              <p:cond delay="0"/>
+                            </p:stCondLst>
+                            <p:childTnLst>
+                              <p:par>
+                                <p:cTn id="11" presetID="1" presetClass="entr" presetSubtype="0" fill="hold" nodeType="clickEffect">
+                                  <p:stCondLst>
+                                    <p:cond delay="0"/>
+                                  </p:stCondLst>
+                                  <p:childTnLst>
+                                    <p:set>
+                                      <p:cBhvr>
+                                        <p:cTn id="12" dur="1" fill="hold">
+                                          <p:stCondLst>
+                                            <p:cond delay="0"/>
+                                          </p:stCondLst>
+                                        </p:cTn>
+                                        <p:tgtEl>
+                                          <p:spTgt spid="3">
+                                            <p:txEl>
+                                              <p:pRg st="1" end="1"/>
+                                            </p:txEl>
+                                          </p:spTgt>
+                                        </p:tgtEl>
+                                        <p:attrNameLst>
+                                          <p:attrName>style.visibility</p:attrName>
+                                        </p:attrNameLst>
+                                      </p:cBhvr>
+                                      <p:to>
+                                        <p:strVal val="visible"/>
+                                      </p:to>
+                                    </p:set>
+                                  </p:childTnLst>
+                                </p:cTn>
+                              </p:par>
+                            </p:childTnLst>
+                          </p:cTn>
+                        </p:par>
+                      </p:childTnLst>
+                    </p:cTn>
+                  </p:par>
+                  <p:par>
+                    <p:cTn id="13" fill="hold">
+                      <p:stCondLst>
+                        <p:cond delay="indefinite"/>
+                      </p:stCondLst>
+                      <p:childTnLst>
+                        <p:par>
+                          <p:cTn id="14" fill="hold">
+                            <p:stCondLst>
+                              <p:cond delay="0"/>
+                            </p:stCondLst>
+                            <p:childTnLst>
+                              <p:par>
+                                <p:cTn id="15" presetID="1" presetClass="entr" presetSubtype="0" fill="hold" nodeType="clickEffect">
+                                  <p:stCondLst>
+                                    <p:cond delay="0"/>
+                                  </p:stCondLst>
+                                  <p:childTnLst>
+                                    <p:set>
+                                      <p:cBhvr>
+                                        <p:cTn id="16" dur="1" fill="hold">
+                                          <p:stCondLst>
+                                            <p:cond delay="0"/>
+                                          </p:stCondLst>
+                                        </p:cTn>
+                                        <p:tgtEl>
+                                          <p:spTgt spid="3">
+                                            <p:txEl>
+                                              <p:pRg st="2" end="2"/>
+                                            </p:txEl>
+                                          </p:spTgt>
+                                        </p:tgtEl>
+                                        <p:attrNameLst>
+                                          <p:attrName>style.visibility</p:attrName>
+                                        </p:attrNameLst>
+                                      </p:cBhvr>
+                                      <p:to>
+                                        <p:strVal val="visible"/>
+                                      </p:to>
+                                    </p:set>
+                                  </p:childTnLst>
+                                </p:cTn>
+                              </p:par>
+                            </p:childTnLst>
+                          </p:cTn>
+                        </p:par>
+                      </p:childTnLst>
+                    </p:cTn>
+                  </p:par>
+                </p:childTnLst>
+              </p:cTn>
+              <p:prevCondLst>
+                <p:cond evt="onPrev" delay="0">
+                  <p:tgtEl>
+                    <p:sldTgt/>
+                  </p:tgtEl>
+                </p:cond>
+              </p:prevCondLst>
+              <p:nextCondLst>
+                <p:cond evt="onNext" delay="0">
+                  <p:tgtEl>
+                    <p:sldTgt/>
+                  </p:tgtEl>
+                </p:cond>
+              </p:nextCondLst>
+            </p:seq>
+          </p:childTnLst>
+        </p:cTn>
+      </p:par>
+    </p:tnLst>
+  </p:timing>
 </p:sld>
 </file>
 
@@ -2926,6 +3519,9 @@
   <p:clrMapOvr>
     <a:masterClrMapping/>
   </p:clrMapOvr>
+  <p:transition spd="slow">
+    <p:push dir="u"/>
+  </p:transition>
 </p:sld>
 </file>
 
@@ -2979,31 +3575,50 @@
           </a:p>
         </p:txBody>
       </p:sp>
-      <p:sp>
-        <p:nvSpPr>
-          <p:cNvPr id="4" name="Espace réservé du texte 3">
+      <p:pic>
+        <p:nvPicPr>
+          <p:cNvPr id="2" name="Image 1">
             <a:extLst>
               <a:ext uri="{FF2B5EF4-FFF2-40B4-BE49-F238E27FC236}">
-                <a16:creationId xmlns:a16="http://schemas.microsoft.com/office/drawing/2014/main" id="{825A1EFD-336B-4D8C-85E3-3D12D633D6C0}"/>
+                <a16:creationId xmlns:a16="http://schemas.microsoft.com/office/drawing/2014/main" id="{86799606-489A-45F7-BB10-B5CF2B8A68D0}"/>
               </a:ext>
             </a:extLst>
           </p:cNvPr>
-          <p:cNvSpPr>
-            <a:spLocks noGrp="1"/>
-          </p:cNvSpPr>
-          <p:nvPr>
-            <p:ph type="body" sz="quarter" idx="11"/>
-          </p:nvPr>
-        </p:nvSpPr>
-        <p:spPr/>
-        <p:txBody>
-          <a:bodyPr/>
-          <a:lstStyle/>
-          <a:p>
-            <a:endParaRPr lang="fr-CH"/>
-          </a:p>
-        </p:txBody>
-      </p:sp>
+          <p:cNvPicPr>
+            <a:picLocks noChangeAspect="1"/>
+          </p:cNvPicPr>
+          <p:nvPr/>
+        </p:nvPicPr>
+        <p:blipFill>
+          <a:blip r:embed="rId2"/>
+          <a:stretch>
+            <a:fillRect/>
+          </a:stretch>
+        </p:blipFill>
+        <p:spPr>
+          <a:xfrm>
+            <a:off x="827584" y="2240456"/>
+            <a:ext cx="6948834" cy="3492800"/>
+          </a:xfrm>
+          <a:prstGeom prst="rect">
+            <a:avLst/>
+          </a:prstGeom>
+          <a:ln w="38100" cap="sq">
+            <a:solidFill>
+              <a:srgbClr val="000000"/>
+            </a:solidFill>
+            <a:prstDash val="solid"/>
+            <a:miter lim="800000"/>
+          </a:ln>
+          <a:effectLst>
+            <a:outerShdw blurRad="50800" dist="38100" dir="2700000" algn="tl" rotWithShape="0">
+              <a:srgbClr val="000000">
+                <a:alpha val="43000"/>
+              </a:srgbClr>
+            </a:outerShdw>
+          </a:effectLst>
+        </p:spPr>
+      </p:pic>
     </p:spTree>
     <p:extLst>
       <p:ext uri="{BB962C8B-B14F-4D97-AF65-F5344CB8AC3E}">
@@ -3014,6 +3629,95 @@
   <p:clrMapOvr>
     <a:masterClrMapping/>
   </p:clrMapOvr>
+  <p:transition spd="slow">
+    <p:push dir="u"/>
+  </p:transition>
+  <p:timing>
+    <p:tnLst>
+      <p:par>
+        <p:cTn id="1" dur="indefinite" restart="never" nodeType="tmRoot">
+          <p:childTnLst>
+            <p:seq concurrent="1" nextAc="seek">
+              <p:cTn id="2" dur="indefinite" nodeType="mainSeq">
+                <p:childTnLst>
+                  <p:par>
+                    <p:cTn id="3" fill="hold">
+                      <p:stCondLst>
+                        <p:cond delay="indefinite"/>
+                        <p:cond evt="onBegin" delay="0">
+                          <p:tn val="2"/>
+                        </p:cond>
+                      </p:stCondLst>
+                      <p:childTnLst>
+                        <p:par>
+                          <p:cTn id="4" fill="hold">
+                            <p:stCondLst>
+                              <p:cond delay="0"/>
+                            </p:stCondLst>
+                            <p:childTnLst>
+                              <p:par>
+                                <p:cTn id="5" presetID="10" presetClass="entr" presetSubtype="0" fill="hold" nodeType="withEffect">
+                                  <p:stCondLst>
+                                    <p:cond delay="0"/>
+                                  </p:stCondLst>
+                                  <p:childTnLst>
+                                    <p:set>
+                                      <p:cBhvr>
+                                        <p:cTn id="6" dur="1" fill="hold">
+                                          <p:stCondLst>
+                                            <p:cond delay="0"/>
+                                          </p:stCondLst>
+                                        </p:cTn>
+                                        <p:tgtEl>
+                                          <p:spTgt spid="2"/>
+                                        </p:tgtEl>
+                                        <p:attrNameLst>
+                                          <p:attrName>style.visibility</p:attrName>
+                                        </p:attrNameLst>
+                                      </p:cBhvr>
+                                      <p:to>
+                                        <p:strVal val="visible"/>
+                                      </p:to>
+                                    </p:set>
+                                    <p:animEffect transition="in" filter="fade">
+                                      <p:cBhvr>
+                                        <p:cTn id="7" dur="500"/>
+                                        <p:tgtEl>
+                                          <p:spTgt spid="2"/>
+                                        </p:tgtEl>
+                                      </p:cBhvr>
+                                    </p:animEffect>
+                                  </p:childTnLst>
+                                </p:cTn>
+                              </p:par>
+                            </p:childTnLst>
+                          </p:cTn>
+                        </p:par>
+                      </p:childTnLst>
+                    </p:cTn>
+                  </p:par>
+                </p:childTnLst>
+              </p:cTn>
+              <p:prevCondLst>
+                <p:cond evt="onPrev" delay="0">
+                  <p:tgtEl>
+                    <p:sldTgt/>
+                  </p:tgtEl>
+                </p:cond>
+              </p:prevCondLst>
+              <p:nextCondLst>
+                <p:cond evt="onNext" delay="0">
+                  <p:tgtEl>
+                    <p:sldTgt/>
+                  </p:tgtEl>
+                </p:cond>
+              </p:nextCondLst>
+            </p:seq>
+          </p:childTnLst>
+        </p:cTn>
+      </p:par>
+    </p:tnLst>
+  </p:timing>
 </p:sld>
 </file>
 
@@ -3067,31 +3771,50 @@
           </a:p>
         </p:txBody>
       </p:sp>
-      <p:sp>
-        <p:nvSpPr>
-          <p:cNvPr id="3" name="Espace réservé du texte 2">
+      <p:pic>
+        <p:nvPicPr>
+          <p:cNvPr id="4" name="Image 3">
             <a:extLst>
               <a:ext uri="{FF2B5EF4-FFF2-40B4-BE49-F238E27FC236}">
-                <a16:creationId xmlns:a16="http://schemas.microsoft.com/office/drawing/2014/main" id="{9E5620E8-6CB3-40AD-B6DE-878B675DABC3}"/>
+                <a16:creationId xmlns:a16="http://schemas.microsoft.com/office/drawing/2014/main" id="{E868719B-66E5-4E26-B9AF-7C2946AC9F99}"/>
               </a:ext>
             </a:extLst>
           </p:cNvPr>
-          <p:cNvSpPr>
-            <a:spLocks noGrp="1"/>
-          </p:cNvSpPr>
-          <p:nvPr>
-            <p:ph type="body" sz="quarter" idx="11"/>
-          </p:nvPr>
-        </p:nvSpPr>
-        <p:spPr/>
-        <p:txBody>
-          <a:bodyPr/>
-          <a:lstStyle/>
-          <a:p>
-            <a:endParaRPr lang="fr-CH"/>
-          </a:p>
-        </p:txBody>
-      </p:sp>
+          <p:cNvPicPr>
+            <a:picLocks noChangeAspect="1"/>
+          </p:cNvPicPr>
+          <p:nvPr/>
+        </p:nvPicPr>
+        <p:blipFill>
+          <a:blip r:embed="rId2"/>
+          <a:stretch>
+            <a:fillRect/>
+          </a:stretch>
+        </p:blipFill>
+        <p:spPr>
+          <a:xfrm>
+            <a:off x="755576" y="3068960"/>
+            <a:ext cx="7092280" cy="1630650"/>
+          </a:xfrm>
+          <a:prstGeom prst="rect">
+            <a:avLst/>
+          </a:prstGeom>
+          <a:ln w="38100" cap="sq">
+            <a:solidFill>
+              <a:srgbClr val="000000"/>
+            </a:solidFill>
+            <a:prstDash val="solid"/>
+            <a:miter lim="800000"/>
+          </a:ln>
+          <a:effectLst>
+            <a:outerShdw blurRad="50800" dist="38100" dir="2700000" algn="tl" rotWithShape="0">
+              <a:srgbClr val="000000">
+                <a:alpha val="43000"/>
+              </a:srgbClr>
+            </a:outerShdw>
+          </a:effectLst>
+        </p:spPr>
+      </p:pic>
     </p:spTree>
     <p:extLst>
       <p:ext uri="{BB962C8B-B14F-4D97-AF65-F5344CB8AC3E}">
@@ -3102,6 +3825,95 @@
   <p:clrMapOvr>
     <a:masterClrMapping/>
   </p:clrMapOvr>
+  <p:transition spd="slow">
+    <p:push dir="u"/>
+  </p:transition>
+  <p:timing>
+    <p:tnLst>
+      <p:par>
+        <p:cTn id="1" dur="indefinite" restart="never" nodeType="tmRoot">
+          <p:childTnLst>
+            <p:seq concurrent="1" nextAc="seek">
+              <p:cTn id="2" dur="indefinite" nodeType="mainSeq">
+                <p:childTnLst>
+                  <p:par>
+                    <p:cTn id="3" fill="hold">
+                      <p:stCondLst>
+                        <p:cond delay="indefinite"/>
+                        <p:cond evt="onBegin" delay="0">
+                          <p:tn val="2"/>
+                        </p:cond>
+                      </p:stCondLst>
+                      <p:childTnLst>
+                        <p:par>
+                          <p:cTn id="4" fill="hold">
+                            <p:stCondLst>
+                              <p:cond delay="0"/>
+                            </p:stCondLst>
+                            <p:childTnLst>
+                              <p:par>
+                                <p:cTn id="5" presetID="10" presetClass="entr" presetSubtype="0" fill="hold" nodeType="withEffect">
+                                  <p:stCondLst>
+                                    <p:cond delay="0"/>
+                                  </p:stCondLst>
+                                  <p:childTnLst>
+                                    <p:set>
+                                      <p:cBhvr>
+                                        <p:cTn id="6" dur="1" fill="hold">
+                                          <p:stCondLst>
+                                            <p:cond delay="0"/>
+                                          </p:stCondLst>
+                                        </p:cTn>
+                                        <p:tgtEl>
+                                          <p:spTgt spid="4"/>
+                                        </p:tgtEl>
+                                        <p:attrNameLst>
+                                          <p:attrName>style.visibility</p:attrName>
+                                        </p:attrNameLst>
+                                      </p:cBhvr>
+                                      <p:to>
+                                        <p:strVal val="visible"/>
+                                      </p:to>
+                                    </p:set>
+                                    <p:animEffect transition="in" filter="fade">
+                                      <p:cBhvr>
+                                        <p:cTn id="7" dur="500"/>
+                                        <p:tgtEl>
+                                          <p:spTgt spid="4"/>
+                                        </p:tgtEl>
+                                      </p:cBhvr>
+                                    </p:animEffect>
+                                  </p:childTnLst>
+                                </p:cTn>
+                              </p:par>
+                            </p:childTnLst>
+                          </p:cTn>
+                        </p:par>
+                      </p:childTnLst>
+                    </p:cTn>
+                  </p:par>
+                </p:childTnLst>
+              </p:cTn>
+              <p:prevCondLst>
+                <p:cond evt="onPrev" delay="0">
+                  <p:tgtEl>
+                    <p:sldTgt/>
+                  </p:tgtEl>
+                </p:cond>
+              </p:prevCondLst>
+              <p:nextCondLst>
+                <p:cond evt="onNext" delay="0">
+                  <p:tgtEl>
+                    <p:sldTgt/>
+                  </p:tgtEl>
+                </p:cond>
+              </p:nextCondLst>
+            </p:seq>
+          </p:childTnLst>
+        </p:cTn>
+      </p:par>
+    </p:tnLst>
+  </p:timing>
 </p:sld>
 </file>
 
@@ -3150,31 +3962,50 @@
           </a:p>
         </p:txBody>
       </p:sp>
-      <p:sp>
-        <p:nvSpPr>
-          <p:cNvPr id="3" name="Espace réservé du texte 2">
+      <p:pic>
+        <p:nvPicPr>
+          <p:cNvPr id="4" name="Image 3">
             <a:extLst>
               <a:ext uri="{FF2B5EF4-FFF2-40B4-BE49-F238E27FC236}">
-                <a16:creationId xmlns:a16="http://schemas.microsoft.com/office/drawing/2014/main" id="{0B245874-B690-42F8-8D01-E8147D16E445}"/>
+                <a16:creationId xmlns:a16="http://schemas.microsoft.com/office/drawing/2014/main" id="{300FC568-6336-443D-B6A5-3DE1CE259843}"/>
               </a:ext>
             </a:extLst>
           </p:cNvPr>
-          <p:cNvSpPr>
-            <a:spLocks noGrp="1"/>
-          </p:cNvSpPr>
-          <p:nvPr>
-            <p:ph type="body" sz="quarter" idx="11"/>
-          </p:nvPr>
-        </p:nvSpPr>
-        <p:spPr/>
-        <p:txBody>
-          <a:bodyPr/>
-          <a:lstStyle/>
-          <a:p>
-            <a:endParaRPr lang="fr-CH" dirty="0"/>
-          </a:p>
-        </p:txBody>
-      </p:sp>
+          <p:cNvPicPr>
+            <a:picLocks noChangeAspect="1"/>
+          </p:cNvPicPr>
+          <p:nvPr/>
+        </p:nvPicPr>
+        <p:blipFill>
+          <a:blip r:embed="rId2"/>
+          <a:stretch>
+            <a:fillRect/>
+          </a:stretch>
+        </p:blipFill>
+        <p:spPr>
+          <a:xfrm>
+            <a:off x="2124602" y="2234891"/>
+            <a:ext cx="4533900" cy="3514725"/>
+          </a:xfrm>
+          <a:prstGeom prst="rect">
+            <a:avLst/>
+          </a:prstGeom>
+          <a:ln w="38100" cap="sq">
+            <a:solidFill>
+              <a:srgbClr val="000000"/>
+            </a:solidFill>
+            <a:prstDash val="solid"/>
+            <a:miter lim="800000"/>
+          </a:ln>
+          <a:effectLst>
+            <a:outerShdw blurRad="50800" dist="38100" dir="2700000" algn="tl" rotWithShape="0">
+              <a:srgbClr val="000000">
+                <a:alpha val="43000"/>
+              </a:srgbClr>
+            </a:outerShdw>
+          </a:effectLst>
+        </p:spPr>
+      </p:pic>
     </p:spTree>
     <p:extLst>
       <p:ext uri="{BB962C8B-B14F-4D97-AF65-F5344CB8AC3E}">
@@ -3185,6 +4016,377 @@
   <p:clrMapOvr>
     <a:masterClrMapping/>
   </p:clrMapOvr>
+  <p:transition spd="slow">
+    <p:push dir="u"/>
+  </p:transition>
+  <p:timing>
+    <p:tnLst>
+      <p:par>
+        <p:cTn id="1" dur="indefinite" restart="never" nodeType="tmRoot">
+          <p:childTnLst>
+            <p:seq concurrent="1" nextAc="seek">
+              <p:cTn id="2" dur="indefinite" nodeType="mainSeq">
+                <p:childTnLst>
+                  <p:par>
+                    <p:cTn id="3" fill="hold">
+                      <p:stCondLst>
+                        <p:cond delay="indefinite"/>
+                        <p:cond evt="onBegin" delay="0">
+                          <p:tn val="2"/>
+                        </p:cond>
+                      </p:stCondLst>
+                      <p:childTnLst>
+                        <p:par>
+                          <p:cTn id="4" fill="hold">
+                            <p:stCondLst>
+                              <p:cond delay="0"/>
+                            </p:stCondLst>
+                            <p:childTnLst>
+                              <p:par>
+                                <p:cTn id="5" presetID="10" presetClass="entr" presetSubtype="0" fill="hold" nodeType="withEffect">
+                                  <p:stCondLst>
+                                    <p:cond delay="0"/>
+                                  </p:stCondLst>
+                                  <p:childTnLst>
+                                    <p:set>
+                                      <p:cBhvr>
+                                        <p:cTn id="6" dur="1" fill="hold">
+                                          <p:stCondLst>
+                                            <p:cond delay="0"/>
+                                          </p:stCondLst>
+                                        </p:cTn>
+                                        <p:tgtEl>
+                                          <p:spTgt spid="4"/>
+                                        </p:tgtEl>
+                                        <p:attrNameLst>
+                                          <p:attrName>style.visibility</p:attrName>
+                                        </p:attrNameLst>
+                                      </p:cBhvr>
+                                      <p:to>
+                                        <p:strVal val="visible"/>
+                                      </p:to>
+                                    </p:set>
+                                    <p:animEffect transition="in" filter="fade">
+                                      <p:cBhvr>
+                                        <p:cTn id="7" dur="500"/>
+                                        <p:tgtEl>
+                                          <p:spTgt spid="4"/>
+                                        </p:tgtEl>
+                                      </p:cBhvr>
+                                    </p:animEffect>
+                                  </p:childTnLst>
+                                </p:cTn>
+                              </p:par>
+                            </p:childTnLst>
+                          </p:cTn>
+                        </p:par>
+                      </p:childTnLst>
+                    </p:cTn>
+                  </p:par>
+                </p:childTnLst>
+              </p:cTn>
+              <p:prevCondLst>
+                <p:cond evt="onPrev" delay="0">
+                  <p:tgtEl>
+                    <p:sldTgt/>
+                  </p:tgtEl>
+                </p:cond>
+              </p:prevCondLst>
+              <p:nextCondLst>
+                <p:cond evt="onNext" delay="0">
+                  <p:tgtEl>
+                    <p:sldTgt/>
+                  </p:tgtEl>
+                </p:cond>
+              </p:nextCondLst>
+            </p:seq>
+          </p:childTnLst>
+        </p:cTn>
+      </p:par>
+    </p:tnLst>
+  </p:timing>
+</p:sld>
+</file>
+
+<file path=ppt/slides/slide8.xml><?xml version="1.0" encoding="utf-8"?>
+<p:sld xmlns:a="http://schemas.openxmlformats.org/drawingml/2006/main" xmlns:r="http://schemas.openxmlformats.org/officeDocument/2006/relationships" xmlns:p="http://schemas.openxmlformats.org/presentationml/2006/main">
+  <p:cSld>
+    <p:spTree>
+      <p:nvGrpSpPr>
+        <p:cNvPr id="1" name=""/>
+        <p:cNvGrpSpPr/>
+        <p:nvPr/>
+      </p:nvGrpSpPr>
+      <p:grpSpPr>
+        <a:xfrm>
+          <a:off x="0" y="0"/>
+          <a:ext cx="0" cy="0"/>
+          <a:chOff x="0" y="0"/>
+          <a:chExt cx="0" cy="0"/>
+        </a:xfrm>
+      </p:grpSpPr>
+      <p:sp>
+        <p:nvSpPr>
+          <p:cNvPr id="2" name="Espace réservé du texte 1">
+            <a:extLst>
+              <a:ext uri="{FF2B5EF4-FFF2-40B4-BE49-F238E27FC236}">
+                <a16:creationId xmlns:a16="http://schemas.microsoft.com/office/drawing/2014/main" id="{6108766E-D05F-4199-8D4D-7CA4C938C7B6}"/>
+              </a:ext>
+            </a:extLst>
+          </p:cNvPr>
+          <p:cNvSpPr>
+            <a:spLocks noGrp="1"/>
+          </p:cNvSpPr>
+          <p:nvPr>
+            <p:ph type="body" sz="quarter" idx="10"/>
+          </p:nvPr>
+        </p:nvSpPr>
+        <p:spPr/>
+        <p:txBody>
+          <a:bodyPr/>
+          <a:lstStyle/>
+          <a:p>
+            <a:r>
+              <a:rPr lang="fr-CH" dirty="0"/>
+              <a:t>Démonstration</a:t>
+            </a:r>
+          </a:p>
+        </p:txBody>
+      </p:sp>
+      <p:pic>
+        <p:nvPicPr>
+          <p:cNvPr id="5" name="Image 4">
+            <a:extLst>
+              <a:ext uri="{FF2B5EF4-FFF2-40B4-BE49-F238E27FC236}">
+                <a16:creationId xmlns:a16="http://schemas.microsoft.com/office/drawing/2014/main" id="{7AF8B6B5-F9EC-45B2-A3CD-488CC613B104}"/>
+              </a:ext>
+            </a:extLst>
+          </p:cNvPr>
+          <p:cNvPicPr>
+            <a:picLocks noChangeAspect="1"/>
+          </p:cNvPicPr>
+          <p:nvPr/>
+        </p:nvPicPr>
+        <p:blipFill>
+          <a:blip r:embed="rId2">
+            <a:clrChange>
+              <a:clrFrom>
+                <a:srgbClr val="FFFFFF"/>
+              </a:clrFrom>
+              <a:clrTo>
+                <a:srgbClr val="FFFFFF">
+                  <a:alpha val="0"/>
+                </a:srgbClr>
+              </a:clrTo>
+            </a:clrChange>
+            <a:duotone>
+              <a:schemeClr val="accent1">
+                <a:shade val="45000"/>
+                <a:satMod val="135000"/>
+              </a:schemeClr>
+              <a:prstClr val="white"/>
+            </a:duotone>
+            <a:extLst>
+              <a:ext uri="{28A0092B-C50C-407E-A947-70E740481C1C}">
+                <a14:useLocalDpi xmlns:a14="http://schemas.microsoft.com/office/drawing/2010/main" val="0"/>
+              </a:ext>
+            </a:extLst>
+          </a:blip>
+          <a:stretch>
+            <a:fillRect/>
+          </a:stretch>
+        </p:blipFill>
+        <p:spPr>
+          <a:xfrm>
+            <a:off x="2627784" y="2319883"/>
+            <a:ext cx="3413373" cy="3413373"/>
+          </a:xfrm>
+          <a:prstGeom prst="rect">
+            <a:avLst/>
+          </a:prstGeom>
+        </p:spPr>
+      </p:pic>
+    </p:spTree>
+    <p:extLst>
+      <p:ext uri="{BB962C8B-B14F-4D97-AF65-F5344CB8AC3E}">
+        <p14:creationId xmlns:p14="http://schemas.microsoft.com/office/powerpoint/2010/main" val="1846783129"/>
+      </p:ext>
+    </p:extLst>
+  </p:cSld>
+  <p:clrMapOvr>
+    <a:masterClrMapping/>
+  </p:clrMapOvr>
+  <p:transition spd="slow">
+    <p:push dir="u"/>
+  </p:transition>
+  <p:timing>
+    <p:tnLst>
+      <p:par>
+        <p:cTn id="1" dur="indefinite" restart="never" nodeType="tmRoot">
+          <p:childTnLst>
+            <p:seq concurrent="1" nextAc="seek">
+              <p:cTn id="2" dur="indefinite" nodeType="mainSeq">
+                <p:childTnLst>
+                  <p:par>
+                    <p:cTn id="3" fill="hold">
+                      <p:stCondLst>
+                        <p:cond delay="indefinite"/>
+                        <p:cond evt="onBegin" delay="0">
+                          <p:tn val="2"/>
+                        </p:cond>
+                      </p:stCondLst>
+                      <p:childTnLst>
+                        <p:par>
+                          <p:cTn id="4" fill="hold">
+                            <p:stCondLst>
+                              <p:cond delay="0"/>
+                            </p:stCondLst>
+                            <p:childTnLst>
+                              <p:par>
+                                <p:cTn id="5" presetID="8" presetClass="emph" presetSubtype="0" fill="hold" nodeType="withEffect">
+                                  <p:stCondLst>
+                                    <p:cond delay="0"/>
+                                  </p:stCondLst>
+                                  <p:childTnLst>
+                                    <p:animRot by="21600000">
+                                      <p:cBhvr>
+                                        <p:cTn id="6" dur="20000" fill="hold"/>
+                                        <p:tgtEl>
+                                          <p:spTgt spid="5"/>
+                                        </p:tgtEl>
+                                        <p:attrNameLst>
+                                          <p:attrName>r</p:attrName>
+                                        </p:attrNameLst>
+                                      </p:cBhvr>
+                                    </p:animRot>
+                                  </p:childTnLst>
+                                </p:cTn>
+                              </p:par>
+                            </p:childTnLst>
+                          </p:cTn>
+                        </p:par>
+                      </p:childTnLst>
+                    </p:cTn>
+                  </p:par>
+                </p:childTnLst>
+              </p:cTn>
+              <p:prevCondLst>
+                <p:cond evt="onPrev" delay="0">
+                  <p:tgtEl>
+                    <p:sldTgt/>
+                  </p:tgtEl>
+                </p:cond>
+              </p:prevCondLst>
+              <p:nextCondLst>
+                <p:cond evt="onNext" delay="0">
+                  <p:tgtEl>
+                    <p:sldTgt/>
+                  </p:tgtEl>
+                </p:cond>
+              </p:nextCondLst>
+            </p:seq>
+          </p:childTnLst>
+        </p:cTn>
+      </p:par>
+    </p:tnLst>
+  </p:timing>
+</p:sld>
+</file>
+
+<file path=ppt/slides/slide9.xml><?xml version="1.0" encoding="utf-8"?>
+<p:sld xmlns:a="http://schemas.openxmlformats.org/drawingml/2006/main" xmlns:r="http://schemas.openxmlformats.org/officeDocument/2006/relationships" xmlns:p="http://schemas.openxmlformats.org/presentationml/2006/main">
+  <p:cSld>
+    <p:spTree>
+      <p:nvGrpSpPr>
+        <p:cNvPr id="1" name=""/>
+        <p:cNvGrpSpPr/>
+        <p:nvPr/>
+      </p:nvGrpSpPr>
+      <p:grpSpPr>
+        <a:xfrm>
+          <a:off x="0" y="0"/>
+          <a:ext cx="0" cy="0"/>
+          <a:chOff x="0" y="0"/>
+          <a:chExt cx="0" cy="0"/>
+        </a:xfrm>
+      </p:grpSpPr>
+      <p:sp>
+        <p:nvSpPr>
+          <p:cNvPr id="2" name="Espace réservé du texte 1">
+            <a:extLst>
+              <a:ext uri="{FF2B5EF4-FFF2-40B4-BE49-F238E27FC236}">
+                <a16:creationId xmlns:a16="http://schemas.microsoft.com/office/drawing/2014/main" id="{62735270-CCE4-495E-A31E-8779F730B9F8}"/>
+              </a:ext>
+            </a:extLst>
+          </p:cNvPr>
+          <p:cNvSpPr>
+            <a:spLocks noGrp="1"/>
+          </p:cNvSpPr>
+          <p:nvPr>
+            <p:ph type="body" sz="quarter" idx="10"/>
+          </p:nvPr>
+        </p:nvSpPr>
+        <p:spPr/>
+        <p:txBody>
+          <a:bodyPr/>
+          <a:lstStyle/>
+          <a:p>
+            <a:r>
+              <a:rPr lang="fr-CH" dirty="0"/>
+              <a:t>Questions</a:t>
+            </a:r>
+          </a:p>
+        </p:txBody>
+      </p:sp>
+      <p:pic>
+        <p:nvPicPr>
+          <p:cNvPr id="5" name="Image 4">
+            <a:extLst>
+              <a:ext uri="{FF2B5EF4-FFF2-40B4-BE49-F238E27FC236}">
+                <a16:creationId xmlns:a16="http://schemas.microsoft.com/office/drawing/2014/main" id="{9519311C-B00F-4339-B63C-A5EF998B4F0D}"/>
+              </a:ext>
+            </a:extLst>
+          </p:cNvPr>
+          <p:cNvPicPr>
+            <a:picLocks noChangeAspect="1"/>
+          </p:cNvPicPr>
+          <p:nvPr/>
+        </p:nvPicPr>
+        <p:blipFill>
+          <a:blip r:embed="rId2">
+            <a:extLst>
+              <a:ext uri="{28A0092B-C50C-407E-A947-70E740481C1C}">
+                <a14:useLocalDpi xmlns:a14="http://schemas.microsoft.com/office/drawing/2010/main" val="0"/>
+              </a:ext>
+            </a:extLst>
+          </a:blip>
+          <a:stretch>
+            <a:fillRect/>
+          </a:stretch>
+        </p:blipFill>
+        <p:spPr>
+          <a:xfrm>
+            <a:off x="2411760" y="2852936"/>
+            <a:ext cx="3810000" cy="3238500"/>
+          </a:xfrm>
+          <a:prstGeom prst="rect">
+            <a:avLst/>
+          </a:prstGeom>
+        </p:spPr>
+      </p:pic>
+    </p:spTree>
+    <p:extLst>
+      <p:ext uri="{BB962C8B-B14F-4D97-AF65-F5344CB8AC3E}">
+        <p14:creationId xmlns:p14="http://schemas.microsoft.com/office/powerpoint/2010/main" val="2147572212"/>
+      </p:ext>
+    </p:extLst>
+  </p:cSld>
+  <p:clrMapOvr>
+    <a:masterClrMapping/>
+  </p:clrMapOvr>
+  <p:transition spd="slow">
+    <p:push dir="u"/>
+  </p:transition>
 </p:sld>
 </file>
 

</xml_diff>

<commit_message>
Modification de la présentation -> Modification d'une phrase et changement du positionnement d'une slide
</commit_message>
<xml_diff>
--- a/presentation_bibliogest_francis_normand.pptx
+++ b/presentation_bibliogest_francis_normand.pptx
@@ -5,7 +5,7 @@
     <p:sldMasterId id="2147483648" r:id="rId1"/>
   </p:sldMasterIdLst>
   <p:notesMasterIdLst>
-    <p:notesMasterId r:id="rId9"/>
+    <p:notesMasterId r:id="rId11"/>
   </p:notesMasterIdLst>
   <p:sldIdLst>
     <p:sldId id="256" r:id="rId2"/>
@@ -15,6 +15,8 @@
     <p:sldId id="260" r:id="rId6"/>
     <p:sldId id="261" r:id="rId7"/>
     <p:sldId id="262" r:id="rId8"/>
+    <p:sldId id="263" r:id="rId9"/>
+    <p:sldId id="264" r:id="rId10"/>
   </p:sldIdLst>
   <p:sldSz cx="9144000" cy="6858000" type="screen4x3"/>
   <p:notesSz cx="6858000" cy="9144000"/>
@@ -218,7 +220,7 @@
             <a:fld id="{15721FE5-6845-46AD-96E9-F55ECB995014}" type="datetimeFigureOut">
               <a:rPr lang="fr-CH" smtClean="0"/>
               <a:pPr/>
-              <a:t>05.06.2018</a:t>
+              <a:t>06.06.2018</a:t>
             </a:fld>
             <a:endParaRPr lang="fr-CH"/>
           </a:p>
@@ -1990,13 +1992,8 @@
             </a:fld>
             <a:r>
               <a:rPr lang="fr-CH" sz="1600" dirty="0"/>
-              <a:t> sur </a:t>
-            </a:r>
-            <a:fld id="{F6C38908-BF14-42A1-B6B2-9CCB7CE44A0A}" type="slidenum">
-              <a:rPr lang="fr-CH" sz="1600" smtClean="0"/>
-              <a:pPr/>
-              <a:t>‹N°›</a:t>
-            </a:fld>
+              <a:t> sur 9</a:t>
+            </a:r>
             <a:r>
               <a:rPr lang="fr-CH" dirty="0"/>
               <a:t> </a:t>
@@ -2555,6 +2552,9 @@
   <p:clrMapOvr>
     <a:masterClrMapping/>
   </p:clrMapOvr>
+  <p:transition spd="slow">
+    <p:push dir="u"/>
+  </p:transition>
 </p:sld>
 </file>
 
@@ -2619,26 +2619,43 @@
             <p:ph type="body" sz="quarter" idx="11"/>
           </p:nvPr>
         </p:nvSpPr>
-        <p:spPr/>
+        <p:spPr>
+          <a:xfrm>
+            <a:off x="540000" y="2420888"/>
+            <a:ext cx="7704000" cy="3742312"/>
+          </a:xfrm>
+        </p:spPr>
         <p:txBody>
           <a:bodyPr/>
           <a:lstStyle/>
           <a:p>
             <a:r>
               <a:rPr lang="fr-CH" dirty="0"/>
-              <a:t>Gestion des livres possédés</a:t>
+              <a:t>Pouvoir gérer :</a:t>
             </a:r>
           </a:p>
           <a:p>
             <a:r>
               <a:rPr lang="fr-CH" dirty="0"/>
-              <a:t>Gestion des livres souhaités</a:t>
+              <a:t>Les livres possédés</a:t>
             </a:r>
           </a:p>
           <a:p>
             <a:r>
               <a:rPr lang="fr-CH" dirty="0"/>
-              <a:t>Recherche de livres similaires</a:t>
+              <a:t> - avec description</a:t>
+            </a:r>
+          </a:p>
+          <a:p>
+            <a:r>
+              <a:rPr lang="fr-CH" dirty="0"/>
+              <a:t>Les livres désirés</a:t>
+            </a:r>
+          </a:p>
+          <a:p>
+            <a:r>
+              <a:rPr lang="fr-CH" dirty="0"/>
+              <a:t>La recherche de livres similaires</a:t>
             </a:r>
           </a:p>
         </p:txBody>
@@ -2683,6 +2700,9 @@
   <p:clrMapOvr>
     <a:masterClrMapping/>
   </p:clrMapOvr>
+  <p:transition spd="slow">
+    <p:push dir="u"/>
+  </p:transition>
   <p:timing>
     <p:tnLst>
       <p:par>
@@ -2704,20 +2724,269 @@
                             </p:stCondLst>
                             <p:childTnLst>
                               <p:par>
-                                <p:cTn id="5" presetID="6" presetClass="emph" presetSubtype="0" fill="hold" nodeType="clickEffect">
+                                <p:cTn id="5" presetID="42" presetClass="path" presetSubtype="0" accel="50000" decel="50000" fill="hold" nodeType="clickEffect">
+                                  <p:stCondLst>
+                                    <p:cond delay="0"/>
+                                  </p:stCondLst>
+                                  <p:childTnLst>
+                                    <p:animMotion origin="layout" path="M -1.94444E-6 4.44444E-6 L 0.28247 -0.09931 " pathEditMode="relative" rAng="0" ptsTypes="AA">
+                                      <p:cBhvr>
+                                        <p:cTn id="6" dur="2000" fill="hold"/>
+                                        <p:tgtEl>
+                                          <p:spTgt spid="4"/>
+                                        </p:tgtEl>
+                                        <p:attrNameLst>
+                                          <p:attrName>ppt_x</p:attrName>
+                                          <p:attrName>ppt_y</p:attrName>
+                                        </p:attrNameLst>
+                                      </p:cBhvr>
+                                      <p:rCtr x="14115" y="-4977"/>
+                                    </p:animMotion>
+                                  </p:childTnLst>
+                                </p:cTn>
+                              </p:par>
+                              <p:par>
+                                <p:cTn id="7" presetID="6" presetClass="emph" presetSubtype="0" fill="hold" nodeType="withEffect">
                                   <p:stCondLst>
                                     <p:cond delay="0"/>
                                   </p:stCondLst>
                                   <p:childTnLst>
                                     <p:animScale>
                                       <p:cBhvr>
-                                        <p:cTn id="6" dur="2000" fill="hold"/>
+                                        <p:cTn id="8" dur="1000" fill="hold"/>
                                         <p:tgtEl>
                                           <p:spTgt spid="4"/>
                                         </p:tgtEl>
                                       </p:cBhvr>
-                                      <p:by x="150000" y="150000"/>
+                                      <p:by x="50000" y="50000"/>
                                     </p:animScale>
+                                  </p:childTnLst>
+                                </p:cTn>
+                              </p:par>
+                              <p:par>
+                                <p:cTn id="9" presetID="1" presetClass="entr" presetSubtype="0" fill="hold" grpId="0" nodeType="withEffect">
+                                  <p:stCondLst>
+                                    <p:cond delay="0"/>
+                                  </p:stCondLst>
+                                  <p:childTnLst>
+                                    <p:set>
+                                      <p:cBhvr>
+                                        <p:cTn id="10" dur="1" fill="hold">
+                                          <p:stCondLst>
+                                            <p:cond delay="0"/>
+                                          </p:stCondLst>
+                                        </p:cTn>
+                                        <p:tgtEl>
+                                          <p:spTgt spid="3">
+                                            <p:txEl>
+                                              <p:pRg st="0" end="0"/>
+                                            </p:txEl>
+                                          </p:spTgt>
+                                        </p:tgtEl>
+                                        <p:attrNameLst>
+                                          <p:attrName>style.visibility</p:attrName>
+                                        </p:attrNameLst>
+                                      </p:cBhvr>
+                                      <p:to>
+                                        <p:strVal val="visible"/>
+                                      </p:to>
+                                    </p:set>
+                                  </p:childTnLst>
+                                </p:cTn>
+                              </p:par>
+                            </p:childTnLst>
+                          </p:cTn>
+                        </p:par>
+                      </p:childTnLst>
+                    </p:cTn>
+                  </p:par>
+                  <p:par>
+                    <p:cTn id="11" fill="hold">
+                      <p:stCondLst>
+                        <p:cond delay="indefinite"/>
+                      </p:stCondLst>
+                      <p:childTnLst>
+                        <p:par>
+                          <p:cTn id="12" fill="hold">
+                            <p:stCondLst>
+                              <p:cond delay="0"/>
+                            </p:stCondLst>
+                            <p:childTnLst>
+                              <p:par>
+                                <p:cTn id="13" presetID="1" presetClass="entr" presetSubtype="0" fill="hold" grpId="0" nodeType="clickEffect">
+                                  <p:stCondLst>
+                                    <p:cond delay="0"/>
+                                  </p:stCondLst>
+                                  <p:childTnLst>
+                                    <p:set>
+                                      <p:cBhvr>
+                                        <p:cTn id="14" dur="1" fill="hold">
+                                          <p:stCondLst>
+                                            <p:cond delay="0"/>
+                                          </p:stCondLst>
+                                        </p:cTn>
+                                        <p:tgtEl>
+                                          <p:spTgt spid="3">
+                                            <p:txEl>
+                                              <p:pRg st="1" end="1"/>
+                                            </p:txEl>
+                                          </p:spTgt>
+                                        </p:tgtEl>
+                                        <p:attrNameLst>
+                                          <p:attrName>style.visibility</p:attrName>
+                                        </p:attrNameLst>
+                                      </p:cBhvr>
+                                      <p:to>
+                                        <p:strVal val="visible"/>
+                                      </p:to>
+                                    </p:set>
+                                  </p:childTnLst>
+                                </p:cTn>
+                              </p:par>
+                            </p:childTnLst>
+                          </p:cTn>
+                        </p:par>
+                      </p:childTnLst>
+                    </p:cTn>
+                  </p:par>
+                  <p:par>
+                    <p:cTn id="15" fill="hold">
+                      <p:stCondLst>
+                        <p:cond delay="indefinite"/>
+                      </p:stCondLst>
+                      <p:childTnLst>
+                        <p:par>
+                          <p:cTn id="16" fill="hold">
+                            <p:stCondLst>
+                              <p:cond delay="0"/>
+                            </p:stCondLst>
+                            <p:childTnLst>
+                              <p:par>
+                                <p:cTn id="17" presetID="1" presetClass="entr" presetSubtype="0" fill="hold" grpId="0" nodeType="clickEffect">
+                                  <p:stCondLst>
+                                    <p:cond delay="0"/>
+                                  </p:stCondLst>
+                                  <p:childTnLst>
+                                    <p:set>
+                                      <p:cBhvr>
+                                        <p:cTn id="18" dur="1" fill="hold">
+                                          <p:stCondLst>
+                                            <p:cond delay="0"/>
+                                          </p:stCondLst>
+                                        </p:cTn>
+                                        <p:tgtEl>
+                                          <p:spTgt spid="3">
+                                            <p:txEl>
+                                              <p:pRg st="2" end="2"/>
+                                            </p:txEl>
+                                          </p:spTgt>
+                                        </p:tgtEl>
+                                        <p:attrNameLst>
+                                          <p:attrName>style.visibility</p:attrName>
+                                        </p:attrNameLst>
+                                      </p:cBhvr>
+                                      <p:to>
+                                        <p:strVal val="visible"/>
+                                      </p:to>
+                                    </p:set>
+                                  </p:childTnLst>
+                                </p:cTn>
+                              </p:par>
+                            </p:childTnLst>
+                          </p:cTn>
+                        </p:par>
+                      </p:childTnLst>
+                    </p:cTn>
+                  </p:par>
+                  <p:par>
+                    <p:cTn id="19" fill="hold">
+                      <p:stCondLst>
+                        <p:cond delay="indefinite"/>
+                      </p:stCondLst>
+                      <p:childTnLst>
+                        <p:par>
+                          <p:cTn id="20" fill="hold">
+                            <p:stCondLst>
+                              <p:cond delay="0"/>
+                            </p:stCondLst>
+                            <p:childTnLst>
+                              <p:par>
+                                <p:cTn id="21" presetID="1" presetClass="entr" presetSubtype="0" fill="hold" grpId="0" nodeType="clickEffect">
+                                  <p:stCondLst>
+                                    <p:cond delay="0"/>
+                                  </p:stCondLst>
+                                  <p:childTnLst>
+                                    <p:set>
+                                      <p:cBhvr>
+                                        <p:cTn id="22" dur="1" fill="hold">
+                                          <p:stCondLst>
+                                            <p:cond delay="0"/>
+                                          </p:stCondLst>
+                                        </p:cTn>
+                                        <p:tgtEl>
+                                          <p:spTgt spid="3">
+                                            <p:txEl>
+                                              <p:pRg st="3" end="3"/>
+                                            </p:txEl>
+                                          </p:spTgt>
+                                        </p:tgtEl>
+                                        <p:attrNameLst>
+                                          <p:attrName>style.visibility</p:attrName>
+                                        </p:attrNameLst>
+                                      </p:cBhvr>
+                                      <p:to>
+                                        <p:strVal val="visible"/>
+                                      </p:to>
+                                    </p:set>
+                                  </p:childTnLst>
+                                </p:cTn>
+                              </p:par>
+                            </p:childTnLst>
+                          </p:cTn>
+                        </p:par>
+                      </p:childTnLst>
+                    </p:cTn>
+                  </p:par>
+                  <p:par>
+                    <p:cTn id="23" fill="hold">
+                      <p:stCondLst>
+                        <p:cond delay="indefinite"/>
+                      </p:stCondLst>
+                      <p:childTnLst>
+                        <p:par>
+                          <p:cTn id="24" fill="hold">
+                            <p:stCondLst>
+                              <p:cond delay="0"/>
+                            </p:stCondLst>
+                            <p:childTnLst>
+                              <p:par>
+                                <p:cTn id="25" presetID="1" presetClass="entr" presetSubtype="0" fill="hold" grpId="0" nodeType="clickEffect">
+                                  <p:stCondLst>
+                                    <p:cond delay="0"/>
+                                  </p:stCondLst>
+                                  <p:childTnLst>
+                                    <p:set>
+                                      <p:cBhvr>
+                                        <p:cTn id="26" dur="1" fill="hold">
+                                          <p:stCondLst>
+                                            <p:cond delay="0"/>
+                                          </p:stCondLst>
+                                        </p:cTn>
+                                        <p:tgtEl>
+                                          <p:spTgt spid="3">
+                                            <p:txEl>
+                                              <p:pRg st="4" end="4"/>
+                                            </p:txEl>
+                                          </p:spTgt>
+                                        </p:tgtEl>
+                                        <p:attrNameLst>
+                                          <p:attrName>style.visibility</p:attrName>
+                                        </p:attrNameLst>
+                                      </p:cBhvr>
+                                      <p:to>
+                                        <p:strVal val="visible"/>
+                                      </p:to>
+                                    </p:set>
                                   </p:childTnLst>
                                 </p:cTn>
                               </p:par>
@@ -2748,6 +3017,9 @@
         </p:cTn>
       </p:par>
     </p:tnLst>
+    <p:bldLst>
+      <p:bldP spid="3" grpId="0" uiExpand="1" build="p"/>
+    </p:bldLst>
   </p:timing>
 </p:sld>
 </file>
@@ -2818,10 +3090,74 @@
           <a:bodyPr/>
           <a:lstStyle/>
           <a:p>
-            <a:endParaRPr lang="fr-CH"/>
+            <a:r>
+              <a:rPr lang="fr-CH" dirty="0"/>
+              <a:t>Application développée en JAVA EE</a:t>
+            </a:r>
+          </a:p>
+          <a:p>
+            <a:r>
+              <a:rPr lang="fr-CH" dirty="0"/>
+              <a:t>Application WEB</a:t>
+            </a:r>
+          </a:p>
+          <a:p>
+            <a:r>
+              <a:rPr lang="fr-CH" dirty="0"/>
+              <a:t>Framework CSS : Bootstrap</a:t>
+            </a:r>
+          </a:p>
+          <a:p>
+            <a:endParaRPr lang="fr-CH" dirty="0"/>
           </a:p>
         </p:txBody>
       </p:sp>
+      <p:pic>
+        <p:nvPicPr>
+          <p:cNvPr id="5" name="Image 4">
+            <a:extLst>
+              <a:ext uri="{FF2B5EF4-FFF2-40B4-BE49-F238E27FC236}">
+                <a16:creationId xmlns:a16="http://schemas.microsoft.com/office/drawing/2014/main" id="{E6FF13EE-D70D-49FF-8642-8CBB71A5A6FF}"/>
+              </a:ext>
+            </a:extLst>
+          </p:cNvPr>
+          <p:cNvPicPr>
+            <a:picLocks noChangeAspect="1"/>
+          </p:cNvPicPr>
+          <p:nvPr/>
+        </p:nvPicPr>
+        <p:blipFill>
+          <a:blip r:embed="rId2" cstate="print">
+            <a:clrChange>
+              <a:clrFrom>
+                <a:srgbClr val="FFFFFF"/>
+              </a:clrFrom>
+              <a:clrTo>
+                <a:srgbClr val="FFFFFF">
+                  <a:alpha val="0"/>
+                </a:srgbClr>
+              </a:clrTo>
+            </a:clrChange>
+            <a:extLst>
+              <a:ext uri="{28A0092B-C50C-407E-A947-70E740481C1C}">
+                <a14:useLocalDpi xmlns:a14="http://schemas.microsoft.com/office/drawing/2010/main" val="0"/>
+              </a:ext>
+            </a:extLst>
+          </a:blip>
+          <a:stretch>
+            <a:fillRect/>
+          </a:stretch>
+        </p:blipFill>
+        <p:spPr>
+          <a:xfrm>
+            <a:off x="2699792" y="3614302"/>
+            <a:ext cx="2875680" cy="2548898"/>
+          </a:xfrm>
+          <a:prstGeom prst="rect">
+            <a:avLst/>
+          </a:prstGeom>
+        </p:spPr>
+      </p:pic>
     </p:spTree>
     <p:extLst>
       <p:ext uri="{BB962C8B-B14F-4D97-AF65-F5344CB8AC3E}">
@@ -2832,6 +3168,213 @@
   <p:clrMapOvr>
     <a:masterClrMapping/>
   </p:clrMapOvr>
+  <p:transition spd="slow">
+    <p:push dir="u"/>
+  </p:transition>
+  <p:timing>
+    <p:tnLst>
+      <p:par>
+        <p:cTn id="1" dur="indefinite" restart="never" nodeType="tmRoot">
+          <p:childTnLst>
+            <p:seq concurrent="1" nextAc="seek">
+              <p:cTn id="2" dur="indefinite" nodeType="mainSeq">
+                <p:childTnLst>
+                  <p:par>
+                    <p:cTn id="3" fill="hold">
+                      <p:stCondLst>
+                        <p:cond delay="indefinite"/>
+                      </p:stCondLst>
+                      <p:childTnLst>
+                        <p:par>
+                          <p:cTn id="4" fill="hold">
+                            <p:stCondLst>
+                              <p:cond delay="0"/>
+                            </p:stCondLst>
+                            <p:childTnLst>
+                              <p:par>
+                                <p:cTn id="5" presetID="1" presetClass="entr" presetSubtype="0" fill="hold" nodeType="clickEffect">
+                                  <p:stCondLst>
+                                    <p:cond delay="0"/>
+                                  </p:stCondLst>
+                                  <p:childTnLst>
+                                    <p:set>
+                                      <p:cBhvr>
+                                        <p:cTn id="6" dur="1" fill="hold">
+                                          <p:stCondLst>
+                                            <p:cond delay="0"/>
+                                          </p:stCondLst>
+                                        </p:cTn>
+                                        <p:tgtEl>
+                                          <p:spTgt spid="3">
+                                            <p:txEl>
+                                              <p:pRg st="0" end="0"/>
+                                            </p:txEl>
+                                          </p:spTgt>
+                                        </p:tgtEl>
+                                        <p:attrNameLst>
+                                          <p:attrName>style.visibility</p:attrName>
+                                        </p:attrNameLst>
+                                      </p:cBhvr>
+                                      <p:to>
+                                        <p:strVal val="visible"/>
+                                      </p:to>
+                                    </p:set>
+                                  </p:childTnLst>
+                                </p:cTn>
+                              </p:par>
+                              <p:par>
+                                <p:cTn id="7" presetID="1" presetClass="entr" presetSubtype="0" fill="hold" nodeType="withEffect">
+                                  <p:stCondLst>
+                                    <p:cond delay="0"/>
+                                  </p:stCondLst>
+                                  <p:childTnLst>
+                                    <p:set>
+                                      <p:cBhvr>
+                                        <p:cTn id="8" dur="1" fill="hold">
+                                          <p:stCondLst>
+                                            <p:cond delay="0"/>
+                                          </p:stCondLst>
+                                        </p:cTn>
+                                        <p:tgtEl>
+                                          <p:spTgt spid="5"/>
+                                        </p:tgtEl>
+                                        <p:attrNameLst>
+                                          <p:attrName>style.visibility</p:attrName>
+                                        </p:attrNameLst>
+                                      </p:cBhvr>
+                                      <p:to>
+                                        <p:strVal val="visible"/>
+                                      </p:to>
+                                    </p:set>
+                                  </p:childTnLst>
+                                </p:cTn>
+                              </p:par>
+                            </p:childTnLst>
+                          </p:cTn>
+                        </p:par>
+                      </p:childTnLst>
+                    </p:cTn>
+                  </p:par>
+                  <p:par>
+                    <p:cTn id="9" fill="hold">
+                      <p:stCondLst>
+                        <p:cond delay="indefinite"/>
+                      </p:stCondLst>
+                      <p:childTnLst>
+                        <p:par>
+                          <p:cTn id="10" fill="hold">
+                            <p:stCondLst>
+                              <p:cond delay="0"/>
+                            </p:stCondLst>
+                            <p:childTnLst>
+                              <p:par>
+                                <p:cTn id="11" presetID="1" presetClass="entr" presetSubtype="0" fill="hold" nodeType="clickEffect">
+                                  <p:stCondLst>
+                                    <p:cond delay="0"/>
+                                  </p:stCondLst>
+                                  <p:childTnLst>
+                                    <p:set>
+                                      <p:cBhvr>
+                                        <p:cTn id="12" dur="1" fill="hold">
+                                          <p:stCondLst>
+                                            <p:cond delay="0"/>
+                                          </p:stCondLst>
+                                        </p:cTn>
+                                        <p:tgtEl>
+                                          <p:spTgt spid="3">
+                                            <p:txEl>
+                                              <p:pRg st="1" end="1"/>
+                                            </p:txEl>
+                                          </p:spTgt>
+                                        </p:tgtEl>
+                                        <p:attrNameLst>
+                                          <p:attrName>style.visibility</p:attrName>
+                                        </p:attrNameLst>
+                                      </p:cBhvr>
+                                      <p:to>
+                                        <p:strVal val="visible"/>
+                                      </p:to>
+                                    </p:set>
+                                  </p:childTnLst>
+                                </p:cTn>
+                              </p:par>
+                            </p:childTnLst>
+                          </p:cTn>
+                        </p:par>
+                      </p:childTnLst>
+                    </p:cTn>
+                  </p:par>
+                  <p:par>
+                    <p:cTn id="13" fill="hold">
+                      <p:stCondLst>
+                        <p:cond delay="indefinite"/>
+                      </p:stCondLst>
+                      <p:childTnLst>
+                        <p:par>
+                          <p:cTn id="14" fill="hold">
+                            <p:stCondLst>
+                              <p:cond delay="0"/>
+                            </p:stCondLst>
+                            <p:childTnLst>
+                              <p:par>
+                                <p:cTn id="15" presetID="1" presetClass="entr" presetSubtype="0" fill="hold" nodeType="clickEffect">
+                                  <p:stCondLst>
+                                    <p:cond delay="0"/>
+                                  </p:stCondLst>
+                                  <p:childTnLst>
+                                    <p:set>
+                                      <p:cBhvr>
+                                        <p:cTn id="16" dur="1" fill="hold">
+                                          <p:stCondLst>
+                                            <p:cond delay="0"/>
+                                          </p:stCondLst>
+                                        </p:cTn>
+                                        <p:tgtEl>
+                                          <p:spTgt spid="3">
+                                            <p:txEl>
+                                              <p:pRg st="2" end="2"/>
+                                            </p:txEl>
+                                          </p:spTgt>
+                                        </p:tgtEl>
+                                        <p:attrNameLst>
+                                          <p:attrName>style.visibility</p:attrName>
+                                        </p:attrNameLst>
+                                      </p:cBhvr>
+                                      <p:to>
+                                        <p:strVal val="visible"/>
+                                      </p:to>
+                                    </p:set>
+                                  </p:childTnLst>
+                                </p:cTn>
+                              </p:par>
+                            </p:childTnLst>
+                          </p:cTn>
+                        </p:par>
+                      </p:childTnLst>
+                    </p:cTn>
+                  </p:par>
+                </p:childTnLst>
+              </p:cTn>
+              <p:prevCondLst>
+                <p:cond evt="onPrev" delay="0">
+                  <p:tgtEl>
+                    <p:sldTgt/>
+                  </p:tgtEl>
+                </p:cond>
+              </p:prevCondLst>
+              <p:nextCondLst>
+                <p:cond evt="onNext" delay="0">
+                  <p:tgtEl>
+                    <p:sldTgt/>
+                  </p:tgtEl>
+                </p:cond>
+              </p:nextCondLst>
+            </p:seq>
+          </p:childTnLst>
+        </p:cTn>
+      </p:par>
+    </p:tnLst>
+  </p:timing>
 </p:sld>
 </file>
 
@@ -2926,6 +3469,9 @@
   <p:clrMapOvr>
     <a:masterClrMapping/>
   </p:clrMapOvr>
+  <p:transition spd="slow">
+    <p:push dir="u"/>
+  </p:transition>
 </p:sld>
 </file>
 
@@ -2979,31 +3525,50 @@
           </a:p>
         </p:txBody>
       </p:sp>
-      <p:sp>
-        <p:nvSpPr>
-          <p:cNvPr id="4" name="Espace réservé du texte 3">
+      <p:pic>
+        <p:nvPicPr>
+          <p:cNvPr id="2" name="Image 1">
             <a:extLst>
               <a:ext uri="{FF2B5EF4-FFF2-40B4-BE49-F238E27FC236}">
-                <a16:creationId xmlns:a16="http://schemas.microsoft.com/office/drawing/2014/main" id="{825A1EFD-336B-4D8C-85E3-3D12D633D6C0}"/>
+                <a16:creationId xmlns:a16="http://schemas.microsoft.com/office/drawing/2014/main" id="{86799606-489A-45F7-BB10-B5CF2B8A68D0}"/>
               </a:ext>
             </a:extLst>
           </p:cNvPr>
-          <p:cNvSpPr>
-            <a:spLocks noGrp="1"/>
-          </p:cNvSpPr>
-          <p:nvPr>
-            <p:ph type="body" sz="quarter" idx="11"/>
-          </p:nvPr>
-        </p:nvSpPr>
-        <p:spPr/>
-        <p:txBody>
-          <a:bodyPr/>
-          <a:lstStyle/>
-          <a:p>
-            <a:endParaRPr lang="fr-CH"/>
-          </a:p>
-        </p:txBody>
-      </p:sp>
+          <p:cNvPicPr>
+            <a:picLocks noChangeAspect="1"/>
+          </p:cNvPicPr>
+          <p:nvPr/>
+        </p:nvPicPr>
+        <p:blipFill>
+          <a:blip r:embed="rId2"/>
+          <a:stretch>
+            <a:fillRect/>
+          </a:stretch>
+        </p:blipFill>
+        <p:spPr>
+          <a:xfrm>
+            <a:off x="827584" y="2240456"/>
+            <a:ext cx="6948834" cy="3492800"/>
+          </a:xfrm>
+          <a:prstGeom prst="rect">
+            <a:avLst/>
+          </a:prstGeom>
+          <a:ln w="38100" cap="sq">
+            <a:solidFill>
+              <a:srgbClr val="000000"/>
+            </a:solidFill>
+            <a:prstDash val="solid"/>
+            <a:miter lim="800000"/>
+          </a:ln>
+          <a:effectLst>
+            <a:outerShdw blurRad="50800" dist="38100" dir="2700000" algn="tl" rotWithShape="0">
+              <a:srgbClr val="000000">
+                <a:alpha val="43000"/>
+              </a:srgbClr>
+            </a:outerShdw>
+          </a:effectLst>
+        </p:spPr>
+      </p:pic>
     </p:spTree>
     <p:extLst>
       <p:ext uri="{BB962C8B-B14F-4D97-AF65-F5344CB8AC3E}">
@@ -3014,6 +3579,95 @@
   <p:clrMapOvr>
     <a:masterClrMapping/>
   </p:clrMapOvr>
+  <p:transition spd="slow">
+    <p:push dir="u"/>
+  </p:transition>
+  <p:timing>
+    <p:tnLst>
+      <p:par>
+        <p:cTn id="1" dur="indefinite" restart="never" nodeType="tmRoot">
+          <p:childTnLst>
+            <p:seq concurrent="1" nextAc="seek">
+              <p:cTn id="2" dur="indefinite" nodeType="mainSeq">
+                <p:childTnLst>
+                  <p:par>
+                    <p:cTn id="3" fill="hold">
+                      <p:stCondLst>
+                        <p:cond delay="indefinite"/>
+                        <p:cond evt="onBegin" delay="0">
+                          <p:tn val="2"/>
+                        </p:cond>
+                      </p:stCondLst>
+                      <p:childTnLst>
+                        <p:par>
+                          <p:cTn id="4" fill="hold">
+                            <p:stCondLst>
+                              <p:cond delay="0"/>
+                            </p:stCondLst>
+                            <p:childTnLst>
+                              <p:par>
+                                <p:cTn id="5" presetID="10" presetClass="entr" presetSubtype="0" fill="hold" nodeType="withEffect">
+                                  <p:stCondLst>
+                                    <p:cond delay="0"/>
+                                  </p:stCondLst>
+                                  <p:childTnLst>
+                                    <p:set>
+                                      <p:cBhvr>
+                                        <p:cTn id="6" dur="1" fill="hold">
+                                          <p:stCondLst>
+                                            <p:cond delay="0"/>
+                                          </p:stCondLst>
+                                        </p:cTn>
+                                        <p:tgtEl>
+                                          <p:spTgt spid="2"/>
+                                        </p:tgtEl>
+                                        <p:attrNameLst>
+                                          <p:attrName>style.visibility</p:attrName>
+                                        </p:attrNameLst>
+                                      </p:cBhvr>
+                                      <p:to>
+                                        <p:strVal val="visible"/>
+                                      </p:to>
+                                    </p:set>
+                                    <p:animEffect transition="in" filter="fade">
+                                      <p:cBhvr>
+                                        <p:cTn id="7" dur="500"/>
+                                        <p:tgtEl>
+                                          <p:spTgt spid="2"/>
+                                        </p:tgtEl>
+                                      </p:cBhvr>
+                                    </p:animEffect>
+                                  </p:childTnLst>
+                                </p:cTn>
+                              </p:par>
+                            </p:childTnLst>
+                          </p:cTn>
+                        </p:par>
+                      </p:childTnLst>
+                    </p:cTn>
+                  </p:par>
+                </p:childTnLst>
+              </p:cTn>
+              <p:prevCondLst>
+                <p:cond evt="onPrev" delay="0">
+                  <p:tgtEl>
+                    <p:sldTgt/>
+                  </p:tgtEl>
+                </p:cond>
+              </p:prevCondLst>
+              <p:nextCondLst>
+                <p:cond evt="onNext" delay="0">
+                  <p:tgtEl>
+                    <p:sldTgt/>
+                  </p:tgtEl>
+                </p:cond>
+              </p:nextCondLst>
+            </p:seq>
+          </p:childTnLst>
+        </p:cTn>
+      </p:par>
+    </p:tnLst>
+  </p:timing>
 </p:sld>
 </file>
 
@@ -3067,31 +3721,50 @@
           </a:p>
         </p:txBody>
       </p:sp>
-      <p:sp>
-        <p:nvSpPr>
-          <p:cNvPr id="3" name="Espace réservé du texte 2">
+      <p:pic>
+        <p:nvPicPr>
+          <p:cNvPr id="4" name="Image 3">
             <a:extLst>
               <a:ext uri="{FF2B5EF4-FFF2-40B4-BE49-F238E27FC236}">
-                <a16:creationId xmlns:a16="http://schemas.microsoft.com/office/drawing/2014/main" id="{9E5620E8-6CB3-40AD-B6DE-878B675DABC3}"/>
+                <a16:creationId xmlns:a16="http://schemas.microsoft.com/office/drawing/2014/main" id="{E868719B-66E5-4E26-B9AF-7C2946AC9F99}"/>
               </a:ext>
             </a:extLst>
           </p:cNvPr>
-          <p:cNvSpPr>
-            <a:spLocks noGrp="1"/>
-          </p:cNvSpPr>
-          <p:nvPr>
-            <p:ph type="body" sz="quarter" idx="11"/>
-          </p:nvPr>
-        </p:nvSpPr>
-        <p:spPr/>
-        <p:txBody>
-          <a:bodyPr/>
-          <a:lstStyle/>
-          <a:p>
-            <a:endParaRPr lang="fr-CH"/>
-          </a:p>
-        </p:txBody>
-      </p:sp>
+          <p:cNvPicPr>
+            <a:picLocks noChangeAspect="1"/>
+          </p:cNvPicPr>
+          <p:nvPr/>
+        </p:nvPicPr>
+        <p:blipFill>
+          <a:blip r:embed="rId2"/>
+          <a:stretch>
+            <a:fillRect/>
+          </a:stretch>
+        </p:blipFill>
+        <p:spPr>
+          <a:xfrm>
+            <a:off x="755576" y="3068960"/>
+            <a:ext cx="7092280" cy="1630650"/>
+          </a:xfrm>
+          <a:prstGeom prst="rect">
+            <a:avLst/>
+          </a:prstGeom>
+          <a:ln w="38100" cap="sq">
+            <a:solidFill>
+              <a:srgbClr val="000000"/>
+            </a:solidFill>
+            <a:prstDash val="solid"/>
+            <a:miter lim="800000"/>
+          </a:ln>
+          <a:effectLst>
+            <a:outerShdw blurRad="50800" dist="38100" dir="2700000" algn="tl" rotWithShape="0">
+              <a:srgbClr val="000000">
+                <a:alpha val="43000"/>
+              </a:srgbClr>
+            </a:outerShdw>
+          </a:effectLst>
+        </p:spPr>
+      </p:pic>
     </p:spTree>
     <p:extLst>
       <p:ext uri="{BB962C8B-B14F-4D97-AF65-F5344CB8AC3E}">
@@ -3102,6 +3775,95 @@
   <p:clrMapOvr>
     <a:masterClrMapping/>
   </p:clrMapOvr>
+  <p:transition spd="slow">
+    <p:push dir="u"/>
+  </p:transition>
+  <p:timing>
+    <p:tnLst>
+      <p:par>
+        <p:cTn id="1" dur="indefinite" restart="never" nodeType="tmRoot">
+          <p:childTnLst>
+            <p:seq concurrent="1" nextAc="seek">
+              <p:cTn id="2" dur="indefinite" nodeType="mainSeq">
+                <p:childTnLst>
+                  <p:par>
+                    <p:cTn id="3" fill="hold">
+                      <p:stCondLst>
+                        <p:cond delay="indefinite"/>
+                        <p:cond evt="onBegin" delay="0">
+                          <p:tn val="2"/>
+                        </p:cond>
+                      </p:stCondLst>
+                      <p:childTnLst>
+                        <p:par>
+                          <p:cTn id="4" fill="hold">
+                            <p:stCondLst>
+                              <p:cond delay="0"/>
+                            </p:stCondLst>
+                            <p:childTnLst>
+                              <p:par>
+                                <p:cTn id="5" presetID="10" presetClass="entr" presetSubtype="0" fill="hold" nodeType="withEffect">
+                                  <p:stCondLst>
+                                    <p:cond delay="0"/>
+                                  </p:stCondLst>
+                                  <p:childTnLst>
+                                    <p:set>
+                                      <p:cBhvr>
+                                        <p:cTn id="6" dur="1" fill="hold">
+                                          <p:stCondLst>
+                                            <p:cond delay="0"/>
+                                          </p:stCondLst>
+                                        </p:cTn>
+                                        <p:tgtEl>
+                                          <p:spTgt spid="4"/>
+                                        </p:tgtEl>
+                                        <p:attrNameLst>
+                                          <p:attrName>style.visibility</p:attrName>
+                                        </p:attrNameLst>
+                                      </p:cBhvr>
+                                      <p:to>
+                                        <p:strVal val="visible"/>
+                                      </p:to>
+                                    </p:set>
+                                    <p:animEffect transition="in" filter="fade">
+                                      <p:cBhvr>
+                                        <p:cTn id="7" dur="500"/>
+                                        <p:tgtEl>
+                                          <p:spTgt spid="4"/>
+                                        </p:tgtEl>
+                                      </p:cBhvr>
+                                    </p:animEffect>
+                                  </p:childTnLst>
+                                </p:cTn>
+                              </p:par>
+                            </p:childTnLst>
+                          </p:cTn>
+                        </p:par>
+                      </p:childTnLst>
+                    </p:cTn>
+                  </p:par>
+                </p:childTnLst>
+              </p:cTn>
+              <p:prevCondLst>
+                <p:cond evt="onPrev" delay="0">
+                  <p:tgtEl>
+                    <p:sldTgt/>
+                  </p:tgtEl>
+                </p:cond>
+              </p:prevCondLst>
+              <p:nextCondLst>
+                <p:cond evt="onNext" delay="0">
+                  <p:tgtEl>
+                    <p:sldTgt/>
+                  </p:tgtEl>
+                </p:cond>
+              </p:nextCondLst>
+            </p:seq>
+          </p:childTnLst>
+        </p:cTn>
+      </p:par>
+    </p:tnLst>
+  </p:timing>
 </p:sld>
 </file>
 
@@ -3150,31 +3912,50 @@
           </a:p>
         </p:txBody>
       </p:sp>
-      <p:sp>
-        <p:nvSpPr>
-          <p:cNvPr id="3" name="Espace réservé du texte 2">
+      <p:pic>
+        <p:nvPicPr>
+          <p:cNvPr id="4" name="Image 3">
             <a:extLst>
               <a:ext uri="{FF2B5EF4-FFF2-40B4-BE49-F238E27FC236}">
-                <a16:creationId xmlns:a16="http://schemas.microsoft.com/office/drawing/2014/main" id="{0B245874-B690-42F8-8D01-E8147D16E445}"/>
+                <a16:creationId xmlns:a16="http://schemas.microsoft.com/office/drawing/2014/main" id="{300FC568-6336-443D-B6A5-3DE1CE259843}"/>
               </a:ext>
             </a:extLst>
           </p:cNvPr>
-          <p:cNvSpPr>
-            <a:spLocks noGrp="1"/>
-          </p:cNvSpPr>
-          <p:nvPr>
-            <p:ph type="body" sz="quarter" idx="11"/>
-          </p:nvPr>
-        </p:nvSpPr>
-        <p:spPr/>
-        <p:txBody>
-          <a:bodyPr/>
-          <a:lstStyle/>
-          <a:p>
-            <a:endParaRPr lang="fr-CH" dirty="0"/>
-          </a:p>
-        </p:txBody>
-      </p:sp>
+          <p:cNvPicPr>
+            <a:picLocks noChangeAspect="1"/>
+          </p:cNvPicPr>
+          <p:nvPr/>
+        </p:nvPicPr>
+        <p:blipFill>
+          <a:blip r:embed="rId2"/>
+          <a:stretch>
+            <a:fillRect/>
+          </a:stretch>
+        </p:blipFill>
+        <p:spPr>
+          <a:xfrm>
+            <a:off x="2124602" y="2234891"/>
+            <a:ext cx="4533900" cy="3514725"/>
+          </a:xfrm>
+          <a:prstGeom prst="rect">
+            <a:avLst/>
+          </a:prstGeom>
+          <a:ln w="38100" cap="sq">
+            <a:solidFill>
+              <a:srgbClr val="000000"/>
+            </a:solidFill>
+            <a:prstDash val="solid"/>
+            <a:miter lim="800000"/>
+          </a:ln>
+          <a:effectLst>
+            <a:outerShdw blurRad="50800" dist="38100" dir="2700000" algn="tl" rotWithShape="0">
+              <a:srgbClr val="000000">
+                <a:alpha val="43000"/>
+              </a:srgbClr>
+            </a:outerShdw>
+          </a:effectLst>
+        </p:spPr>
+      </p:pic>
     </p:spTree>
     <p:extLst>
       <p:ext uri="{BB962C8B-B14F-4D97-AF65-F5344CB8AC3E}">
@@ -3185,6 +3966,377 @@
   <p:clrMapOvr>
     <a:masterClrMapping/>
   </p:clrMapOvr>
+  <p:transition spd="slow">
+    <p:push dir="u"/>
+  </p:transition>
+  <p:timing>
+    <p:tnLst>
+      <p:par>
+        <p:cTn id="1" dur="indefinite" restart="never" nodeType="tmRoot">
+          <p:childTnLst>
+            <p:seq concurrent="1" nextAc="seek">
+              <p:cTn id="2" dur="indefinite" nodeType="mainSeq">
+                <p:childTnLst>
+                  <p:par>
+                    <p:cTn id="3" fill="hold">
+                      <p:stCondLst>
+                        <p:cond delay="indefinite"/>
+                        <p:cond evt="onBegin" delay="0">
+                          <p:tn val="2"/>
+                        </p:cond>
+                      </p:stCondLst>
+                      <p:childTnLst>
+                        <p:par>
+                          <p:cTn id="4" fill="hold">
+                            <p:stCondLst>
+                              <p:cond delay="0"/>
+                            </p:stCondLst>
+                            <p:childTnLst>
+                              <p:par>
+                                <p:cTn id="5" presetID="10" presetClass="entr" presetSubtype="0" fill="hold" nodeType="withEffect">
+                                  <p:stCondLst>
+                                    <p:cond delay="0"/>
+                                  </p:stCondLst>
+                                  <p:childTnLst>
+                                    <p:set>
+                                      <p:cBhvr>
+                                        <p:cTn id="6" dur="1" fill="hold">
+                                          <p:stCondLst>
+                                            <p:cond delay="0"/>
+                                          </p:stCondLst>
+                                        </p:cTn>
+                                        <p:tgtEl>
+                                          <p:spTgt spid="4"/>
+                                        </p:tgtEl>
+                                        <p:attrNameLst>
+                                          <p:attrName>style.visibility</p:attrName>
+                                        </p:attrNameLst>
+                                      </p:cBhvr>
+                                      <p:to>
+                                        <p:strVal val="visible"/>
+                                      </p:to>
+                                    </p:set>
+                                    <p:animEffect transition="in" filter="fade">
+                                      <p:cBhvr>
+                                        <p:cTn id="7" dur="500"/>
+                                        <p:tgtEl>
+                                          <p:spTgt spid="4"/>
+                                        </p:tgtEl>
+                                      </p:cBhvr>
+                                    </p:animEffect>
+                                  </p:childTnLst>
+                                </p:cTn>
+                              </p:par>
+                            </p:childTnLst>
+                          </p:cTn>
+                        </p:par>
+                      </p:childTnLst>
+                    </p:cTn>
+                  </p:par>
+                </p:childTnLst>
+              </p:cTn>
+              <p:prevCondLst>
+                <p:cond evt="onPrev" delay="0">
+                  <p:tgtEl>
+                    <p:sldTgt/>
+                  </p:tgtEl>
+                </p:cond>
+              </p:prevCondLst>
+              <p:nextCondLst>
+                <p:cond evt="onNext" delay="0">
+                  <p:tgtEl>
+                    <p:sldTgt/>
+                  </p:tgtEl>
+                </p:cond>
+              </p:nextCondLst>
+            </p:seq>
+          </p:childTnLst>
+        </p:cTn>
+      </p:par>
+    </p:tnLst>
+  </p:timing>
+</p:sld>
+</file>
+
+<file path=ppt/slides/slide8.xml><?xml version="1.0" encoding="utf-8"?>
+<p:sld xmlns:a="http://schemas.openxmlformats.org/drawingml/2006/main" xmlns:r="http://schemas.openxmlformats.org/officeDocument/2006/relationships" xmlns:p="http://schemas.openxmlformats.org/presentationml/2006/main">
+  <p:cSld>
+    <p:spTree>
+      <p:nvGrpSpPr>
+        <p:cNvPr id="1" name=""/>
+        <p:cNvGrpSpPr/>
+        <p:nvPr/>
+      </p:nvGrpSpPr>
+      <p:grpSpPr>
+        <a:xfrm>
+          <a:off x="0" y="0"/>
+          <a:ext cx="0" cy="0"/>
+          <a:chOff x="0" y="0"/>
+          <a:chExt cx="0" cy="0"/>
+        </a:xfrm>
+      </p:grpSpPr>
+      <p:sp>
+        <p:nvSpPr>
+          <p:cNvPr id="2" name="Espace réservé du texte 1">
+            <a:extLst>
+              <a:ext uri="{FF2B5EF4-FFF2-40B4-BE49-F238E27FC236}">
+                <a16:creationId xmlns:a16="http://schemas.microsoft.com/office/drawing/2014/main" id="{6108766E-D05F-4199-8D4D-7CA4C938C7B6}"/>
+              </a:ext>
+            </a:extLst>
+          </p:cNvPr>
+          <p:cNvSpPr>
+            <a:spLocks noGrp="1"/>
+          </p:cNvSpPr>
+          <p:nvPr>
+            <p:ph type="body" sz="quarter" idx="10"/>
+          </p:nvPr>
+        </p:nvSpPr>
+        <p:spPr/>
+        <p:txBody>
+          <a:bodyPr/>
+          <a:lstStyle/>
+          <a:p>
+            <a:r>
+              <a:rPr lang="fr-CH" dirty="0"/>
+              <a:t>Démonstration</a:t>
+            </a:r>
+          </a:p>
+        </p:txBody>
+      </p:sp>
+      <p:pic>
+        <p:nvPicPr>
+          <p:cNvPr id="5" name="Image 4">
+            <a:extLst>
+              <a:ext uri="{FF2B5EF4-FFF2-40B4-BE49-F238E27FC236}">
+                <a16:creationId xmlns:a16="http://schemas.microsoft.com/office/drawing/2014/main" id="{7AF8B6B5-F9EC-45B2-A3CD-488CC613B104}"/>
+              </a:ext>
+            </a:extLst>
+          </p:cNvPr>
+          <p:cNvPicPr>
+            <a:picLocks noChangeAspect="1"/>
+          </p:cNvPicPr>
+          <p:nvPr/>
+        </p:nvPicPr>
+        <p:blipFill>
+          <a:blip r:embed="rId2">
+            <a:clrChange>
+              <a:clrFrom>
+                <a:srgbClr val="FFFFFF"/>
+              </a:clrFrom>
+              <a:clrTo>
+                <a:srgbClr val="FFFFFF">
+                  <a:alpha val="0"/>
+                </a:srgbClr>
+              </a:clrTo>
+            </a:clrChange>
+            <a:duotone>
+              <a:schemeClr val="accent1">
+                <a:shade val="45000"/>
+                <a:satMod val="135000"/>
+              </a:schemeClr>
+              <a:prstClr val="white"/>
+            </a:duotone>
+            <a:extLst>
+              <a:ext uri="{28A0092B-C50C-407E-A947-70E740481C1C}">
+                <a14:useLocalDpi xmlns:a14="http://schemas.microsoft.com/office/drawing/2010/main" val="0"/>
+              </a:ext>
+            </a:extLst>
+          </a:blip>
+          <a:stretch>
+            <a:fillRect/>
+          </a:stretch>
+        </p:blipFill>
+        <p:spPr>
+          <a:xfrm>
+            <a:off x="2627784" y="2319883"/>
+            <a:ext cx="3413373" cy="3413373"/>
+          </a:xfrm>
+          <a:prstGeom prst="rect">
+            <a:avLst/>
+          </a:prstGeom>
+        </p:spPr>
+      </p:pic>
+    </p:spTree>
+    <p:extLst>
+      <p:ext uri="{BB962C8B-B14F-4D97-AF65-F5344CB8AC3E}">
+        <p14:creationId xmlns:p14="http://schemas.microsoft.com/office/powerpoint/2010/main" val="1846783129"/>
+      </p:ext>
+    </p:extLst>
+  </p:cSld>
+  <p:clrMapOvr>
+    <a:masterClrMapping/>
+  </p:clrMapOvr>
+  <p:transition spd="slow">
+    <p:push dir="u"/>
+  </p:transition>
+  <p:timing>
+    <p:tnLst>
+      <p:par>
+        <p:cTn id="1" dur="indefinite" restart="never" nodeType="tmRoot">
+          <p:childTnLst>
+            <p:seq concurrent="1" nextAc="seek">
+              <p:cTn id="2" dur="indefinite" nodeType="mainSeq">
+                <p:childTnLst>
+                  <p:par>
+                    <p:cTn id="3" fill="hold">
+                      <p:stCondLst>
+                        <p:cond delay="indefinite"/>
+                        <p:cond evt="onBegin" delay="0">
+                          <p:tn val="2"/>
+                        </p:cond>
+                      </p:stCondLst>
+                      <p:childTnLst>
+                        <p:par>
+                          <p:cTn id="4" fill="hold">
+                            <p:stCondLst>
+                              <p:cond delay="0"/>
+                            </p:stCondLst>
+                            <p:childTnLst>
+                              <p:par>
+                                <p:cTn id="5" presetID="8" presetClass="emph" presetSubtype="0" fill="hold" nodeType="withEffect">
+                                  <p:stCondLst>
+                                    <p:cond delay="0"/>
+                                  </p:stCondLst>
+                                  <p:childTnLst>
+                                    <p:animRot by="21600000">
+                                      <p:cBhvr>
+                                        <p:cTn id="6" dur="20000" fill="hold"/>
+                                        <p:tgtEl>
+                                          <p:spTgt spid="5"/>
+                                        </p:tgtEl>
+                                        <p:attrNameLst>
+                                          <p:attrName>r</p:attrName>
+                                        </p:attrNameLst>
+                                      </p:cBhvr>
+                                    </p:animRot>
+                                  </p:childTnLst>
+                                </p:cTn>
+                              </p:par>
+                            </p:childTnLst>
+                          </p:cTn>
+                        </p:par>
+                      </p:childTnLst>
+                    </p:cTn>
+                  </p:par>
+                </p:childTnLst>
+              </p:cTn>
+              <p:prevCondLst>
+                <p:cond evt="onPrev" delay="0">
+                  <p:tgtEl>
+                    <p:sldTgt/>
+                  </p:tgtEl>
+                </p:cond>
+              </p:prevCondLst>
+              <p:nextCondLst>
+                <p:cond evt="onNext" delay="0">
+                  <p:tgtEl>
+                    <p:sldTgt/>
+                  </p:tgtEl>
+                </p:cond>
+              </p:nextCondLst>
+            </p:seq>
+          </p:childTnLst>
+        </p:cTn>
+      </p:par>
+    </p:tnLst>
+  </p:timing>
+</p:sld>
+</file>
+
+<file path=ppt/slides/slide9.xml><?xml version="1.0" encoding="utf-8"?>
+<p:sld xmlns:a="http://schemas.openxmlformats.org/drawingml/2006/main" xmlns:r="http://schemas.openxmlformats.org/officeDocument/2006/relationships" xmlns:p="http://schemas.openxmlformats.org/presentationml/2006/main">
+  <p:cSld>
+    <p:spTree>
+      <p:nvGrpSpPr>
+        <p:cNvPr id="1" name=""/>
+        <p:cNvGrpSpPr/>
+        <p:nvPr/>
+      </p:nvGrpSpPr>
+      <p:grpSpPr>
+        <a:xfrm>
+          <a:off x="0" y="0"/>
+          <a:ext cx="0" cy="0"/>
+          <a:chOff x="0" y="0"/>
+          <a:chExt cx="0" cy="0"/>
+        </a:xfrm>
+      </p:grpSpPr>
+      <p:sp>
+        <p:nvSpPr>
+          <p:cNvPr id="2" name="Espace réservé du texte 1">
+            <a:extLst>
+              <a:ext uri="{FF2B5EF4-FFF2-40B4-BE49-F238E27FC236}">
+                <a16:creationId xmlns:a16="http://schemas.microsoft.com/office/drawing/2014/main" id="{62735270-CCE4-495E-A31E-8779F730B9F8}"/>
+              </a:ext>
+            </a:extLst>
+          </p:cNvPr>
+          <p:cNvSpPr>
+            <a:spLocks noGrp="1"/>
+          </p:cNvSpPr>
+          <p:nvPr>
+            <p:ph type="body" sz="quarter" idx="10"/>
+          </p:nvPr>
+        </p:nvSpPr>
+        <p:spPr/>
+        <p:txBody>
+          <a:bodyPr/>
+          <a:lstStyle/>
+          <a:p>
+            <a:r>
+              <a:rPr lang="fr-CH" dirty="0"/>
+              <a:t>Questions</a:t>
+            </a:r>
+          </a:p>
+        </p:txBody>
+      </p:sp>
+      <p:pic>
+        <p:nvPicPr>
+          <p:cNvPr id="5" name="Image 4">
+            <a:extLst>
+              <a:ext uri="{FF2B5EF4-FFF2-40B4-BE49-F238E27FC236}">
+                <a16:creationId xmlns:a16="http://schemas.microsoft.com/office/drawing/2014/main" id="{9519311C-B00F-4339-B63C-A5EF998B4F0D}"/>
+              </a:ext>
+            </a:extLst>
+          </p:cNvPr>
+          <p:cNvPicPr>
+            <a:picLocks noChangeAspect="1"/>
+          </p:cNvPicPr>
+          <p:nvPr/>
+        </p:nvPicPr>
+        <p:blipFill>
+          <a:blip r:embed="rId2">
+            <a:extLst>
+              <a:ext uri="{28A0092B-C50C-407E-A947-70E740481C1C}">
+                <a14:useLocalDpi xmlns:a14="http://schemas.microsoft.com/office/drawing/2010/main" val="0"/>
+              </a:ext>
+            </a:extLst>
+          </a:blip>
+          <a:stretch>
+            <a:fillRect/>
+          </a:stretch>
+        </p:blipFill>
+        <p:spPr>
+          <a:xfrm>
+            <a:off x="2411760" y="2852936"/>
+            <a:ext cx="3810000" cy="3238500"/>
+          </a:xfrm>
+          <a:prstGeom prst="rect">
+            <a:avLst/>
+          </a:prstGeom>
+        </p:spPr>
+      </p:pic>
+    </p:spTree>
+    <p:extLst>
+      <p:ext uri="{BB962C8B-B14F-4D97-AF65-F5344CB8AC3E}">
+        <p14:creationId xmlns:p14="http://schemas.microsoft.com/office/powerpoint/2010/main" val="2147572212"/>
+      </p:ext>
+    </p:extLst>
+  </p:cSld>
+  <p:clrMapOvr>
+    <a:masterClrMapping/>
+  </p:clrMapOvr>
+  <p:transition spd="slow">
+    <p:push dir="u"/>
+  </p:transition>
 </p:sld>
 </file>
 

</xml_diff>